<commit_message>
geom notes: add figures to document vertex and edge labeling for a box and tetrahedron
Former-commit-id: beb0089b25dce89bf733d5d26652e2e574ac0afd [formerly 0a77249e02ac7d77ded4472b28d050495ba8a497]
Former-commit-id: 3c21a3f31d19d1f5af9c23472ada547fd1149fab
Former-commit-id: 4bfdf3d12f3e12e4eb11a8b46bd63511473fe3f5
</commit_message>
<xml_diff>
--- a/Manuals/SMV_Technical_Reference_Guide/FIGURES/geom_setup.pptx
+++ b/Manuals/SMV_Technical_Reference_Guide/FIGURES/geom_setup.pptx
@@ -8,6 +8,7 @@
     <p:sldId id="256" r:id="rId2"/>
     <p:sldId id="257" r:id="rId3"/>
     <p:sldId id="258" r:id="rId4"/>
+    <p:sldId id="259" r:id="rId5"/>
   </p:sldIdLst>
   <p:sldSz cx="9144000" cy="6858000" type="screen4x3"/>
   <p:notesSz cx="7315200" cy="9601200"/>
@@ -291,7 +292,7 @@
             <a:fld id="{1D8BD707-D9CF-40AE-B4C6-C98DA3205C09}" type="datetimeFigureOut">
               <a:rPr lang="en-US" smtClean="0"/>
               <a:pPr/>
-              <a:t>5/12/2014</a:t>
+              <a:t>10/30/2014</a:t>
             </a:fld>
             <a:endParaRPr lang="en-US"/>
           </a:p>
@@ -458,7 +459,7 @@
             <a:fld id="{1D8BD707-D9CF-40AE-B4C6-C98DA3205C09}" type="datetimeFigureOut">
               <a:rPr lang="en-US" smtClean="0"/>
               <a:pPr/>
-              <a:t>5/12/2014</a:t>
+              <a:t>10/30/2014</a:t>
             </a:fld>
             <a:endParaRPr lang="en-US"/>
           </a:p>
@@ -635,7 +636,7 @@
             <a:fld id="{1D8BD707-D9CF-40AE-B4C6-C98DA3205C09}" type="datetimeFigureOut">
               <a:rPr lang="en-US" smtClean="0"/>
               <a:pPr/>
-              <a:t>5/12/2014</a:t>
+              <a:t>10/30/2014</a:t>
             </a:fld>
             <a:endParaRPr lang="en-US"/>
           </a:p>
@@ -802,7 +803,7 @@
             <a:fld id="{1D8BD707-D9CF-40AE-B4C6-C98DA3205C09}" type="datetimeFigureOut">
               <a:rPr lang="en-US" smtClean="0"/>
               <a:pPr/>
-              <a:t>5/12/2014</a:t>
+              <a:t>10/30/2014</a:t>
             </a:fld>
             <a:endParaRPr lang="en-US"/>
           </a:p>
@@ -1045,7 +1046,7 @@
             <a:fld id="{1D8BD707-D9CF-40AE-B4C6-C98DA3205C09}" type="datetimeFigureOut">
               <a:rPr lang="en-US" smtClean="0"/>
               <a:pPr/>
-              <a:t>5/12/2014</a:t>
+              <a:t>10/30/2014</a:t>
             </a:fld>
             <a:endParaRPr lang="en-US"/>
           </a:p>
@@ -1330,7 +1331,7 @@
             <a:fld id="{1D8BD707-D9CF-40AE-B4C6-C98DA3205C09}" type="datetimeFigureOut">
               <a:rPr lang="en-US" smtClean="0"/>
               <a:pPr/>
-              <a:t>5/12/2014</a:t>
+              <a:t>10/30/2014</a:t>
             </a:fld>
             <a:endParaRPr lang="en-US"/>
           </a:p>
@@ -1749,7 +1750,7 @@
             <a:fld id="{1D8BD707-D9CF-40AE-B4C6-C98DA3205C09}" type="datetimeFigureOut">
               <a:rPr lang="en-US" smtClean="0"/>
               <a:pPr/>
-              <a:t>5/12/2014</a:t>
+              <a:t>10/30/2014</a:t>
             </a:fld>
             <a:endParaRPr lang="en-US"/>
           </a:p>
@@ -1864,7 +1865,7 @@
             <a:fld id="{1D8BD707-D9CF-40AE-B4C6-C98DA3205C09}" type="datetimeFigureOut">
               <a:rPr lang="en-US" smtClean="0"/>
               <a:pPr/>
-              <a:t>5/12/2014</a:t>
+              <a:t>10/30/2014</a:t>
             </a:fld>
             <a:endParaRPr lang="en-US"/>
           </a:p>
@@ -1956,7 +1957,7 @@
             <a:fld id="{1D8BD707-D9CF-40AE-B4C6-C98DA3205C09}" type="datetimeFigureOut">
               <a:rPr lang="en-US" smtClean="0"/>
               <a:pPr/>
-              <a:t>5/12/2014</a:t>
+              <a:t>10/30/2014</a:t>
             </a:fld>
             <a:endParaRPr lang="en-US"/>
           </a:p>
@@ -2230,7 +2231,7 @@
             <a:fld id="{1D8BD707-D9CF-40AE-B4C6-C98DA3205C09}" type="datetimeFigureOut">
               <a:rPr lang="en-US" smtClean="0"/>
               <a:pPr/>
-              <a:t>5/12/2014</a:t>
+              <a:t>10/30/2014</a:t>
             </a:fld>
             <a:endParaRPr lang="en-US"/>
           </a:p>
@@ -2480,7 +2481,7 @@
             <a:fld id="{1D8BD707-D9CF-40AE-B4C6-C98DA3205C09}" type="datetimeFigureOut">
               <a:rPr lang="en-US" smtClean="0"/>
               <a:pPr/>
-              <a:t>5/12/2014</a:t>
+              <a:t>10/30/2014</a:t>
             </a:fld>
             <a:endParaRPr lang="en-US"/>
           </a:p>
@@ -2690,7 +2691,7 @@
             <a:fld id="{1D8BD707-D9CF-40AE-B4C6-C98DA3205C09}" type="datetimeFigureOut">
               <a:rPr lang="en-US" smtClean="0"/>
               <a:pPr/>
-              <a:t>5/12/2014</a:t>
+              <a:t>10/30/2014</a:t>
             </a:fld>
             <a:endParaRPr lang="en-US"/>
           </a:p>
@@ -6441,10 +6442,2211 @@
           <a:chExt cx="0" cy="0"/>
         </a:xfrm>
       </p:grpSpPr>
+      <p:sp>
+        <p:nvSpPr>
+          <p:cNvPr id="2" name="Oval 1"/>
+          <p:cNvSpPr/>
+          <p:nvPr/>
+        </p:nvSpPr>
+        <p:spPr>
+          <a:xfrm>
+            <a:off x="2264875" y="1219200"/>
+            <a:ext cx="152400" cy="152400"/>
+          </a:xfrm>
+          <a:prstGeom prst="ellipse">
+            <a:avLst/>
+          </a:prstGeom>
+          <a:solidFill>
+            <a:schemeClr val="tx1"/>
+          </a:solidFill>
+          <a:ln>
+            <a:solidFill>
+              <a:schemeClr val="tx1"/>
+            </a:solidFill>
+          </a:ln>
+        </p:spPr>
+        <p:style>
+          <a:lnRef idx="2">
+            <a:schemeClr val="accent1">
+              <a:shade val="50000"/>
+            </a:schemeClr>
+          </a:lnRef>
+          <a:fillRef idx="1">
+            <a:schemeClr val="accent1"/>
+          </a:fillRef>
+          <a:effectRef idx="0">
+            <a:schemeClr val="accent1"/>
+          </a:effectRef>
+          <a:fontRef idx="minor">
+            <a:schemeClr val="lt1"/>
+          </a:fontRef>
+        </p:style>
+        <p:txBody>
+          <a:bodyPr rtlCol="0" anchor="ctr"/>
+          <a:lstStyle/>
+          <a:p>
+            <a:pPr algn="ctr"/>
+            <a:endParaRPr lang="en-US"/>
+          </a:p>
+        </p:txBody>
+      </p:sp>
+      <p:sp>
+        <p:nvSpPr>
+          <p:cNvPr id="3" name="Oval 2"/>
+          <p:cNvSpPr/>
+          <p:nvPr/>
+        </p:nvSpPr>
+        <p:spPr>
+          <a:xfrm>
+            <a:off x="3962400" y="3352800"/>
+            <a:ext cx="152400" cy="152400"/>
+          </a:xfrm>
+          <a:prstGeom prst="ellipse">
+            <a:avLst/>
+          </a:prstGeom>
+          <a:solidFill>
+            <a:schemeClr val="tx1"/>
+          </a:solidFill>
+          <a:ln>
+            <a:solidFill>
+              <a:schemeClr val="tx1"/>
+            </a:solidFill>
+          </a:ln>
+        </p:spPr>
+        <p:style>
+          <a:lnRef idx="2">
+            <a:schemeClr val="accent1">
+              <a:shade val="50000"/>
+            </a:schemeClr>
+          </a:lnRef>
+          <a:fillRef idx="1">
+            <a:schemeClr val="accent1"/>
+          </a:fillRef>
+          <a:effectRef idx="0">
+            <a:schemeClr val="accent1"/>
+          </a:effectRef>
+          <a:fontRef idx="minor">
+            <a:schemeClr val="lt1"/>
+          </a:fontRef>
+        </p:style>
+        <p:txBody>
+          <a:bodyPr rtlCol="0" anchor="ctr"/>
+          <a:lstStyle/>
+          <a:p>
+            <a:pPr algn="ctr"/>
+            <a:endParaRPr lang="en-US"/>
+          </a:p>
+        </p:txBody>
+      </p:sp>
+      <p:sp>
+        <p:nvSpPr>
+          <p:cNvPr id="4" name="Oval 3"/>
+          <p:cNvSpPr/>
+          <p:nvPr/>
+        </p:nvSpPr>
+        <p:spPr>
+          <a:xfrm>
+            <a:off x="3810000" y="4648200"/>
+            <a:ext cx="152400" cy="152400"/>
+          </a:xfrm>
+          <a:prstGeom prst="ellipse">
+            <a:avLst/>
+          </a:prstGeom>
+          <a:solidFill>
+            <a:schemeClr val="tx1"/>
+          </a:solidFill>
+          <a:ln>
+            <a:solidFill>
+              <a:schemeClr val="tx1"/>
+            </a:solidFill>
+          </a:ln>
+        </p:spPr>
+        <p:style>
+          <a:lnRef idx="2">
+            <a:schemeClr val="accent1">
+              <a:shade val="50000"/>
+            </a:schemeClr>
+          </a:lnRef>
+          <a:fillRef idx="1">
+            <a:schemeClr val="accent1"/>
+          </a:fillRef>
+          <a:effectRef idx="0">
+            <a:schemeClr val="accent1"/>
+          </a:effectRef>
+          <a:fontRef idx="minor">
+            <a:schemeClr val="lt1"/>
+          </a:fontRef>
+        </p:style>
+        <p:txBody>
+          <a:bodyPr rtlCol="0" anchor="ctr"/>
+          <a:lstStyle/>
+          <a:p>
+            <a:pPr algn="ctr"/>
+            <a:endParaRPr lang="en-US"/>
+          </a:p>
+        </p:txBody>
+      </p:sp>
+      <p:sp>
+        <p:nvSpPr>
+          <p:cNvPr id="5" name="Oval 4"/>
+          <p:cNvSpPr/>
+          <p:nvPr/>
+        </p:nvSpPr>
+        <p:spPr>
+          <a:xfrm>
+            <a:off x="1143000" y="4581053"/>
+            <a:ext cx="152400" cy="152400"/>
+          </a:xfrm>
+          <a:prstGeom prst="ellipse">
+            <a:avLst/>
+          </a:prstGeom>
+          <a:solidFill>
+            <a:schemeClr val="tx1"/>
+          </a:solidFill>
+          <a:ln>
+            <a:solidFill>
+              <a:schemeClr val="tx1"/>
+            </a:solidFill>
+          </a:ln>
+        </p:spPr>
+        <p:style>
+          <a:lnRef idx="2">
+            <a:schemeClr val="accent1">
+              <a:shade val="50000"/>
+            </a:schemeClr>
+          </a:lnRef>
+          <a:fillRef idx="1">
+            <a:schemeClr val="accent1"/>
+          </a:fillRef>
+          <a:effectRef idx="0">
+            <a:schemeClr val="accent1"/>
+          </a:effectRef>
+          <a:fontRef idx="minor">
+            <a:schemeClr val="lt1"/>
+          </a:fontRef>
+        </p:style>
+        <p:txBody>
+          <a:bodyPr rtlCol="0" anchor="ctr"/>
+          <a:lstStyle/>
+          <a:p>
+            <a:pPr algn="ctr"/>
+            <a:endParaRPr lang="en-US"/>
+          </a:p>
+        </p:txBody>
+      </p:sp>
+      <p:cxnSp>
+        <p:nvCxnSpPr>
+          <p:cNvPr id="7" name="Straight Connector 6"/>
+          <p:cNvCxnSpPr/>
+          <p:nvPr/>
+        </p:nvCxnSpPr>
+        <p:spPr>
+          <a:xfrm flipH="1">
+            <a:off x="1219200" y="1219200"/>
+            <a:ext cx="1121875" cy="3361853"/>
+          </a:xfrm>
+          <a:prstGeom prst="line">
+            <a:avLst/>
+          </a:prstGeom>
+          <a:ln w="25400">
+            <a:solidFill>
+              <a:schemeClr val="tx1"/>
+            </a:solidFill>
+          </a:ln>
+        </p:spPr>
+        <p:style>
+          <a:lnRef idx="1">
+            <a:schemeClr val="accent1"/>
+          </a:lnRef>
+          <a:fillRef idx="0">
+            <a:schemeClr val="accent1"/>
+          </a:fillRef>
+          <a:effectRef idx="0">
+            <a:schemeClr val="accent1"/>
+          </a:effectRef>
+          <a:fontRef idx="minor">
+            <a:schemeClr val="tx1"/>
+          </a:fontRef>
+        </p:style>
+      </p:cxnSp>
+      <p:cxnSp>
+        <p:nvCxnSpPr>
+          <p:cNvPr id="9" name="Straight Connector 8"/>
+          <p:cNvCxnSpPr/>
+          <p:nvPr/>
+        </p:nvCxnSpPr>
+        <p:spPr>
+          <a:xfrm>
+            <a:off x="2367798" y="1276858"/>
+            <a:ext cx="1491679" cy="3456159"/>
+          </a:xfrm>
+          <a:prstGeom prst="line">
+            <a:avLst/>
+          </a:prstGeom>
+          <a:ln w="25400">
+            <a:solidFill>
+              <a:schemeClr val="tx1"/>
+            </a:solidFill>
+          </a:ln>
+        </p:spPr>
+        <p:style>
+          <a:lnRef idx="1">
+            <a:schemeClr val="accent1"/>
+          </a:lnRef>
+          <a:fillRef idx="0">
+            <a:schemeClr val="accent1"/>
+          </a:fillRef>
+          <a:effectRef idx="0">
+            <a:schemeClr val="accent1"/>
+          </a:effectRef>
+          <a:fontRef idx="minor">
+            <a:schemeClr val="tx1"/>
+          </a:fontRef>
+        </p:style>
+      </p:cxnSp>
+      <p:cxnSp>
+        <p:nvCxnSpPr>
+          <p:cNvPr id="11" name="Straight Connector 10"/>
+          <p:cNvCxnSpPr/>
+          <p:nvPr/>
+        </p:nvCxnSpPr>
+        <p:spPr>
+          <a:xfrm>
+            <a:off x="2394957" y="1267805"/>
+            <a:ext cx="1643643" cy="2155918"/>
+          </a:xfrm>
+          <a:prstGeom prst="line">
+            <a:avLst/>
+          </a:prstGeom>
+          <a:ln w="25400">
+            <a:solidFill>
+              <a:schemeClr val="tx1"/>
+            </a:solidFill>
+          </a:ln>
+        </p:spPr>
+        <p:style>
+          <a:lnRef idx="1">
+            <a:schemeClr val="accent1"/>
+          </a:lnRef>
+          <a:fillRef idx="0">
+            <a:schemeClr val="accent1"/>
+          </a:fillRef>
+          <a:effectRef idx="0">
+            <a:schemeClr val="accent1"/>
+          </a:effectRef>
+          <a:fontRef idx="minor">
+            <a:schemeClr val="tx1"/>
+          </a:fontRef>
+        </p:style>
+      </p:cxnSp>
+      <p:cxnSp>
+        <p:nvCxnSpPr>
+          <p:cNvPr id="13" name="Straight Connector 12"/>
+          <p:cNvCxnSpPr>
+            <a:stCxn id="3" idx="4"/>
+            <a:endCxn id="4" idx="5"/>
+          </p:cNvCxnSpPr>
+          <p:nvPr/>
+        </p:nvCxnSpPr>
+        <p:spPr>
+          <a:xfrm flipH="1">
+            <a:off x="3940082" y="3505200"/>
+            <a:ext cx="98518" cy="1273082"/>
+          </a:xfrm>
+          <a:prstGeom prst="line">
+            <a:avLst/>
+          </a:prstGeom>
+          <a:ln w="25400">
+            <a:solidFill>
+              <a:schemeClr val="tx1"/>
+            </a:solidFill>
+          </a:ln>
+        </p:spPr>
+        <p:style>
+          <a:lnRef idx="1">
+            <a:schemeClr val="accent1"/>
+          </a:lnRef>
+          <a:fillRef idx="0">
+            <a:schemeClr val="accent1"/>
+          </a:fillRef>
+          <a:effectRef idx="0">
+            <a:schemeClr val="accent1"/>
+          </a:effectRef>
+          <a:fontRef idx="minor">
+            <a:schemeClr val="tx1"/>
+          </a:fontRef>
+        </p:style>
+      </p:cxnSp>
+      <p:cxnSp>
+        <p:nvCxnSpPr>
+          <p:cNvPr id="15" name="Straight Connector 14"/>
+          <p:cNvCxnSpPr>
+            <a:stCxn id="4" idx="2"/>
+            <a:endCxn id="5" idx="5"/>
+          </p:cNvCxnSpPr>
+          <p:nvPr/>
+        </p:nvCxnSpPr>
+        <p:spPr>
+          <a:xfrm flipH="1" flipV="1">
+            <a:off x="1273082" y="4711135"/>
+            <a:ext cx="2536918" cy="13265"/>
+          </a:xfrm>
+          <a:prstGeom prst="line">
+            <a:avLst/>
+          </a:prstGeom>
+          <a:ln w="25400">
+            <a:solidFill>
+              <a:schemeClr val="tx1"/>
+            </a:solidFill>
+          </a:ln>
+        </p:spPr>
+        <p:style>
+          <a:lnRef idx="1">
+            <a:schemeClr val="accent1"/>
+          </a:lnRef>
+          <a:fillRef idx="0">
+            <a:schemeClr val="accent1"/>
+          </a:fillRef>
+          <a:effectRef idx="0">
+            <a:schemeClr val="accent1"/>
+          </a:effectRef>
+          <a:fontRef idx="minor">
+            <a:schemeClr val="tx1"/>
+          </a:fontRef>
+        </p:style>
+      </p:cxnSp>
+      <p:cxnSp>
+        <p:nvCxnSpPr>
+          <p:cNvPr id="22" name="Straight Connector 21"/>
+          <p:cNvCxnSpPr>
+            <a:stCxn id="3" idx="2"/>
+          </p:cNvCxnSpPr>
+          <p:nvPr/>
+        </p:nvCxnSpPr>
+        <p:spPr>
+          <a:xfrm flipH="1">
+            <a:off x="1232029" y="3429000"/>
+            <a:ext cx="2730371" cy="1241082"/>
+          </a:xfrm>
+          <a:prstGeom prst="line">
+            <a:avLst/>
+          </a:prstGeom>
+          <a:ln w="25400">
+            <a:solidFill>
+              <a:schemeClr val="tx1"/>
+            </a:solidFill>
+            <a:prstDash val="dash"/>
+          </a:ln>
+        </p:spPr>
+        <p:style>
+          <a:lnRef idx="1">
+            <a:schemeClr val="accent1"/>
+          </a:lnRef>
+          <a:fillRef idx="0">
+            <a:schemeClr val="accent1"/>
+          </a:fillRef>
+          <a:effectRef idx="0">
+            <a:schemeClr val="accent1"/>
+          </a:effectRef>
+          <a:fontRef idx="minor">
+            <a:schemeClr val="tx1"/>
+          </a:fontRef>
+        </p:style>
+      </p:cxnSp>
+      <p:sp>
+        <p:nvSpPr>
+          <p:cNvPr id="24" name="TextBox 23"/>
+          <p:cNvSpPr txBox="1"/>
+          <p:nvPr/>
+        </p:nvSpPr>
+        <p:spPr>
+          <a:xfrm>
+            <a:off x="763613" y="4883564"/>
+            <a:ext cx="405880" cy="369332"/>
+          </a:xfrm>
+          <a:prstGeom prst="rect">
+            <a:avLst/>
+          </a:prstGeom>
+          <a:noFill/>
+        </p:spPr>
+        <p:txBody>
+          <a:bodyPr wrap="none" rtlCol="0">
+            <a:spAutoFit/>
+          </a:bodyPr>
+          <a:lstStyle/>
+          <a:p>
+            <a:r>
+              <a:rPr lang="en-US" dirty="0" smtClean="0"/>
+              <a:t>v0</a:t>
+            </a:r>
+            <a:endParaRPr lang="en-US" dirty="0"/>
+          </a:p>
+        </p:txBody>
+      </p:sp>
+      <p:sp>
+        <p:nvSpPr>
+          <p:cNvPr id="25" name="TextBox 24"/>
+          <p:cNvSpPr txBox="1"/>
+          <p:nvPr/>
+        </p:nvSpPr>
+        <p:spPr>
+          <a:xfrm>
+            <a:off x="4185723" y="3171910"/>
+            <a:ext cx="405880" cy="369332"/>
+          </a:xfrm>
+          <a:prstGeom prst="rect">
+            <a:avLst/>
+          </a:prstGeom>
+          <a:noFill/>
+        </p:spPr>
+        <p:txBody>
+          <a:bodyPr wrap="none" rtlCol="0">
+            <a:spAutoFit/>
+          </a:bodyPr>
+          <a:lstStyle/>
+          <a:p>
+            <a:r>
+              <a:rPr lang="en-US" dirty="0" smtClean="0"/>
+              <a:t>v2</a:t>
+            </a:r>
+            <a:endParaRPr lang="en-US" dirty="0"/>
+          </a:p>
+        </p:txBody>
+      </p:sp>
+      <p:sp>
+        <p:nvSpPr>
+          <p:cNvPr id="26" name="TextBox 25"/>
+          <p:cNvSpPr txBox="1"/>
+          <p:nvPr/>
+        </p:nvSpPr>
+        <p:spPr>
+          <a:xfrm>
+            <a:off x="3992399" y="4883564"/>
+            <a:ext cx="405880" cy="369332"/>
+          </a:xfrm>
+          <a:prstGeom prst="rect">
+            <a:avLst/>
+          </a:prstGeom>
+          <a:noFill/>
+        </p:spPr>
+        <p:txBody>
+          <a:bodyPr wrap="none" rtlCol="0">
+            <a:spAutoFit/>
+          </a:bodyPr>
+          <a:lstStyle/>
+          <a:p>
+            <a:r>
+              <a:rPr lang="en-US" dirty="0" smtClean="0"/>
+              <a:t>v1</a:t>
+            </a:r>
+            <a:endParaRPr lang="en-US" dirty="0"/>
+          </a:p>
+        </p:txBody>
+      </p:sp>
+      <p:sp>
+        <p:nvSpPr>
+          <p:cNvPr id="27" name="TextBox 26"/>
+          <p:cNvSpPr txBox="1"/>
+          <p:nvPr/>
+        </p:nvSpPr>
+        <p:spPr>
+          <a:xfrm>
+            <a:off x="1904571" y="1002098"/>
+            <a:ext cx="405880" cy="369332"/>
+          </a:xfrm>
+          <a:prstGeom prst="rect">
+            <a:avLst/>
+          </a:prstGeom>
+          <a:noFill/>
+        </p:spPr>
+        <p:txBody>
+          <a:bodyPr wrap="none" rtlCol="0">
+            <a:spAutoFit/>
+          </a:bodyPr>
+          <a:lstStyle/>
+          <a:p>
+            <a:r>
+              <a:rPr lang="en-US" dirty="0" smtClean="0"/>
+              <a:t>v3</a:t>
+            </a:r>
+            <a:endParaRPr lang="en-US" dirty="0"/>
+          </a:p>
+        </p:txBody>
+      </p:sp>
+      <p:sp>
+        <p:nvSpPr>
+          <p:cNvPr id="28" name="TextBox 27"/>
+          <p:cNvSpPr txBox="1"/>
+          <p:nvPr/>
+        </p:nvSpPr>
+        <p:spPr>
+          <a:xfrm>
+            <a:off x="2239855" y="4517682"/>
+            <a:ext cx="417102" cy="369332"/>
+          </a:xfrm>
+          <a:prstGeom prst="rect">
+            <a:avLst/>
+          </a:prstGeom>
+          <a:solidFill>
+            <a:schemeClr val="bg1"/>
+          </a:solidFill>
+        </p:spPr>
+        <p:txBody>
+          <a:bodyPr wrap="none" rtlCol="0">
+            <a:spAutoFit/>
+          </a:bodyPr>
+          <a:lstStyle/>
+          <a:p>
+            <a:r>
+              <a:rPr lang="en-US" dirty="0"/>
+              <a:t>e</a:t>
+            </a:r>
+            <a:r>
+              <a:rPr lang="en-US" dirty="0" smtClean="0"/>
+              <a:t>0</a:t>
+            </a:r>
+            <a:endParaRPr lang="en-US" dirty="0"/>
+          </a:p>
+        </p:txBody>
+      </p:sp>
+      <p:sp>
+        <p:nvSpPr>
+          <p:cNvPr id="34" name="TextBox 33"/>
+          <p:cNvSpPr txBox="1"/>
+          <p:nvPr/>
+        </p:nvSpPr>
+        <p:spPr>
+          <a:xfrm>
+            <a:off x="3207290" y="2324827"/>
+            <a:ext cx="417102" cy="369332"/>
+          </a:xfrm>
+          <a:prstGeom prst="rect">
+            <a:avLst/>
+          </a:prstGeom>
+          <a:solidFill>
+            <a:schemeClr val="bg1"/>
+          </a:solidFill>
+        </p:spPr>
+        <p:txBody>
+          <a:bodyPr wrap="none" rtlCol="0">
+            <a:spAutoFit/>
+          </a:bodyPr>
+          <a:lstStyle/>
+          <a:p>
+            <a:r>
+              <a:rPr lang="en-US" dirty="0" smtClean="0"/>
+              <a:t>e5</a:t>
+            </a:r>
+            <a:endParaRPr lang="en-US" dirty="0"/>
+          </a:p>
+        </p:txBody>
+      </p:sp>
+      <p:sp>
+        <p:nvSpPr>
+          <p:cNvPr id="35" name="TextBox 34"/>
+          <p:cNvSpPr txBox="1"/>
+          <p:nvPr/>
+        </p:nvSpPr>
+        <p:spPr>
+          <a:xfrm>
+            <a:off x="2998959" y="2895600"/>
+            <a:ext cx="417102" cy="369332"/>
+          </a:xfrm>
+          <a:prstGeom prst="rect">
+            <a:avLst/>
+          </a:prstGeom>
+          <a:solidFill>
+            <a:schemeClr val="bg1"/>
+          </a:solidFill>
+        </p:spPr>
+        <p:txBody>
+          <a:bodyPr wrap="none" rtlCol="0">
+            <a:spAutoFit/>
+          </a:bodyPr>
+          <a:lstStyle/>
+          <a:p>
+            <a:r>
+              <a:rPr lang="en-US" dirty="0" smtClean="0"/>
+              <a:t>e4</a:t>
+            </a:r>
+            <a:endParaRPr lang="en-US" dirty="0"/>
+          </a:p>
+        </p:txBody>
+      </p:sp>
+      <p:sp>
+        <p:nvSpPr>
+          <p:cNvPr id="36" name="TextBox 35"/>
+          <p:cNvSpPr txBox="1"/>
+          <p:nvPr/>
+        </p:nvSpPr>
+        <p:spPr>
+          <a:xfrm>
+            <a:off x="1572379" y="2949918"/>
+            <a:ext cx="417102" cy="369332"/>
+          </a:xfrm>
+          <a:prstGeom prst="rect">
+            <a:avLst/>
+          </a:prstGeom>
+          <a:solidFill>
+            <a:schemeClr val="bg1"/>
+          </a:solidFill>
+        </p:spPr>
+        <p:txBody>
+          <a:bodyPr wrap="none" rtlCol="0">
+            <a:spAutoFit/>
+          </a:bodyPr>
+          <a:lstStyle/>
+          <a:p>
+            <a:r>
+              <a:rPr lang="en-US" dirty="0" smtClean="0"/>
+              <a:t>e3</a:t>
+            </a:r>
+            <a:endParaRPr lang="en-US" dirty="0"/>
+          </a:p>
+        </p:txBody>
+      </p:sp>
+      <p:sp>
+        <p:nvSpPr>
+          <p:cNvPr id="37" name="TextBox 36"/>
+          <p:cNvSpPr txBox="1"/>
+          <p:nvPr/>
+        </p:nvSpPr>
+        <p:spPr>
+          <a:xfrm>
+            <a:off x="2438400" y="3874485"/>
+            <a:ext cx="417102" cy="369332"/>
+          </a:xfrm>
+          <a:prstGeom prst="rect">
+            <a:avLst/>
+          </a:prstGeom>
+          <a:solidFill>
+            <a:schemeClr val="bg1"/>
+          </a:solidFill>
+        </p:spPr>
+        <p:txBody>
+          <a:bodyPr wrap="none" rtlCol="0">
+            <a:spAutoFit/>
+          </a:bodyPr>
+          <a:lstStyle/>
+          <a:p>
+            <a:r>
+              <a:rPr lang="en-US" dirty="0" smtClean="0"/>
+              <a:t>e2</a:t>
+            </a:r>
+            <a:endParaRPr lang="en-US" dirty="0"/>
+          </a:p>
+        </p:txBody>
+      </p:sp>
+      <p:sp>
+        <p:nvSpPr>
+          <p:cNvPr id="38" name="TextBox 37"/>
+          <p:cNvSpPr txBox="1"/>
+          <p:nvPr/>
+        </p:nvSpPr>
+        <p:spPr>
+          <a:xfrm>
+            <a:off x="3849235" y="3886200"/>
+            <a:ext cx="417102" cy="369332"/>
+          </a:xfrm>
+          <a:prstGeom prst="rect">
+            <a:avLst/>
+          </a:prstGeom>
+          <a:solidFill>
+            <a:schemeClr val="bg1"/>
+          </a:solidFill>
+        </p:spPr>
+        <p:txBody>
+          <a:bodyPr wrap="none" rtlCol="0">
+            <a:spAutoFit/>
+          </a:bodyPr>
+          <a:lstStyle/>
+          <a:p>
+            <a:r>
+              <a:rPr lang="en-US" dirty="0" smtClean="0"/>
+              <a:t>e1</a:t>
+            </a:r>
+            <a:endParaRPr lang="en-US" dirty="0"/>
+          </a:p>
+        </p:txBody>
+      </p:sp>
     </p:spTree>
     <p:extLst>
       <p:ext uri="{BB962C8B-B14F-4D97-AF65-F5344CB8AC3E}">
         <p14:creationId xmlns:p14="http://schemas.microsoft.com/office/powerpoint/2010/main" val="3846678207"/>
+      </p:ext>
+    </p:extLst>
+  </p:cSld>
+  <p:clrMapOvr>
+    <a:masterClrMapping/>
+  </p:clrMapOvr>
+  <p:timing>
+    <p:tnLst>
+      <p:par>
+        <p:cTn id="1" dur="indefinite" restart="never" nodeType="tmRoot"/>
+      </p:par>
+    </p:tnLst>
+  </p:timing>
+</p:sld>
+</file>
+
+<file path=ppt/slides/slide4.xml><?xml version="1.0" encoding="utf-8"?>
+<p:sld xmlns:a="http://schemas.openxmlformats.org/drawingml/2006/main" xmlns:r="http://schemas.openxmlformats.org/officeDocument/2006/relationships" xmlns:p="http://schemas.openxmlformats.org/presentationml/2006/main">
+  <p:cSld>
+    <p:spTree>
+      <p:nvGrpSpPr>
+        <p:cNvPr id="1" name=""/>
+        <p:cNvGrpSpPr/>
+        <p:nvPr/>
+      </p:nvGrpSpPr>
+      <p:grpSpPr>
+        <a:xfrm>
+          <a:off x="0" y="0"/>
+          <a:ext cx="0" cy="0"/>
+          <a:chOff x="0" y="0"/>
+          <a:chExt cx="0" cy="0"/>
+        </a:xfrm>
+      </p:grpSpPr>
+      <p:sp>
+        <p:nvSpPr>
+          <p:cNvPr id="23" name="Oval 22"/>
+          <p:cNvSpPr/>
+          <p:nvPr/>
+        </p:nvSpPr>
+        <p:spPr>
+          <a:xfrm>
+            <a:off x="1828800" y="3200400"/>
+            <a:ext cx="152400" cy="152400"/>
+          </a:xfrm>
+          <a:prstGeom prst="ellipse">
+            <a:avLst/>
+          </a:prstGeom>
+          <a:solidFill>
+            <a:schemeClr val="tx1"/>
+          </a:solidFill>
+          <a:ln>
+            <a:solidFill>
+              <a:schemeClr val="tx1"/>
+            </a:solidFill>
+          </a:ln>
+        </p:spPr>
+        <p:style>
+          <a:lnRef idx="2">
+            <a:schemeClr val="accent1">
+              <a:shade val="50000"/>
+            </a:schemeClr>
+          </a:lnRef>
+          <a:fillRef idx="1">
+            <a:schemeClr val="accent1"/>
+          </a:fillRef>
+          <a:effectRef idx="0">
+            <a:schemeClr val="accent1"/>
+          </a:effectRef>
+          <a:fontRef idx="minor">
+            <a:schemeClr val="lt1"/>
+          </a:fontRef>
+        </p:style>
+        <p:txBody>
+          <a:bodyPr rtlCol="0" anchor="ctr"/>
+          <a:lstStyle/>
+          <a:p>
+            <a:pPr algn="ctr"/>
+            <a:endParaRPr lang="en-US"/>
+          </a:p>
+        </p:txBody>
+      </p:sp>
+      <p:sp>
+        <p:nvSpPr>
+          <p:cNvPr id="53" name="Oval 52"/>
+          <p:cNvSpPr/>
+          <p:nvPr/>
+        </p:nvSpPr>
+        <p:spPr>
+          <a:xfrm>
+            <a:off x="4572000" y="3200400"/>
+            <a:ext cx="152400" cy="152400"/>
+          </a:xfrm>
+          <a:prstGeom prst="ellipse">
+            <a:avLst/>
+          </a:prstGeom>
+          <a:solidFill>
+            <a:schemeClr val="tx1"/>
+          </a:solidFill>
+          <a:ln>
+            <a:solidFill>
+              <a:schemeClr val="tx1"/>
+            </a:solidFill>
+          </a:ln>
+        </p:spPr>
+        <p:style>
+          <a:lnRef idx="2">
+            <a:schemeClr val="accent1">
+              <a:shade val="50000"/>
+            </a:schemeClr>
+          </a:lnRef>
+          <a:fillRef idx="1">
+            <a:schemeClr val="accent1"/>
+          </a:fillRef>
+          <a:effectRef idx="0">
+            <a:schemeClr val="accent1"/>
+          </a:effectRef>
+          <a:fontRef idx="minor">
+            <a:schemeClr val="lt1"/>
+          </a:fontRef>
+        </p:style>
+        <p:txBody>
+          <a:bodyPr rtlCol="0" anchor="ctr"/>
+          <a:lstStyle/>
+          <a:p>
+            <a:pPr algn="ctr"/>
+            <a:endParaRPr lang="en-US"/>
+          </a:p>
+        </p:txBody>
+      </p:sp>
+      <p:sp>
+        <p:nvSpPr>
+          <p:cNvPr id="54" name="Oval 53"/>
+          <p:cNvSpPr/>
+          <p:nvPr/>
+        </p:nvSpPr>
+        <p:spPr>
+          <a:xfrm>
+            <a:off x="1828800" y="5943600"/>
+            <a:ext cx="152400" cy="152400"/>
+          </a:xfrm>
+          <a:prstGeom prst="ellipse">
+            <a:avLst/>
+          </a:prstGeom>
+          <a:solidFill>
+            <a:schemeClr val="tx1"/>
+          </a:solidFill>
+          <a:ln>
+            <a:solidFill>
+              <a:schemeClr val="tx1"/>
+            </a:solidFill>
+          </a:ln>
+        </p:spPr>
+        <p:style>
+          <a:lnRef idx="2">
+            <a:schemeClr val="accent1">
+              <a:shade val="50000"/>
+            </a:schemeClr>
+          </a:lnRef>
+          <a:fillRef idx="1">
+            <a:schemeClr val="accent1"/>
+          </a:fillRef>
+          <a:effectRef idx="0">
+            <a:schemeClr val="accent1"/>
+          </a:effectRef>
+          <a:fontRef idx="minor">
+            <a:schemeClr val="lt1"/>
+          </a:fontRef>
+        </p:style>
+        <p:txBody>
+          <a:bodyPr rtlCol="0" anchor="ctr"/>
+          <a:lstStyle/>
+          <a:p>
+            <a:pPr algn="ctr"/>
+            <a:endParaRPr lang="en-US"/>
+          </a:p>
+        </p:txBody>
+      </p:sp>
+      <p:sp>
+        <p:nvSpPr>
+          <p:cNvPr id="55" name="Oval 54"/>
+          <p:cNvSpPr/>
+          <p:nvPr/>
+        </p:nvSpPr>
+        <p:spPr>
+          <a:xfrm>
+            <a:off x="4572000" y="5943600"/>
+            <a:ext cx="152400" cy="152400"/>
+          </a:xfrm>
+          <a:prstGeom prst="ellipse">
+            <a:avLst/>
+          </a:prstGeom>
+          <a:solidFill>
+            <a:schemeClr val="tx1"/>
+          </a:solidFill>
+          <a:ln>
+            <a:solidFill>
+              <a:schemeClr val="tx1"/>
+            </a:solidFill>
+          </a:ln>
+        </p:spPr>
+        <p:style>
+          <a:lnRef idx="2">
+            <a:schemeClr val="accent1">
+              <a:shade val="50000"/>
+            </a:schemeClr>
+          </a:lnRef>
+          <a:fillRef idx="1">
+            <a:schemeClr val="accent1"/>
+          </a:fillRef>
+          <a:effectRef idx="0">
+            <a:schemeClr val="accent1"/>
+          </a:effectRef>
+          <a:fontRef idx="minor">
+            <a:schemeClr val="lt1"/>
+          </a:fontRef>
+        </p:style>
+        <p:txBody>
+          <a:bodyPr rtlCol="0" anchor="ctr"/>
+          <a:lstStyle/>
+          <a:p>
+            <a:pPr algn="ctr"/>
+            <a:endParaRPr lang="en-US"/>
+          </a:p>
+        </p:txBody>
+      </p:sp>
+      <p:sp>
+        <p:nvSpPr>
+          <p:cNvPr id="56" name="Oval 55"/>
+          <p:cNvSpPr/>
+          <p:nvPr/>
+        </p:nvSpPr>
+        <p:spPr>
+          <a:xfrm>
+            <a:off x="2819400" y="1828800"/>
+            <a:ext cx="152400" cy="152400"/>
+          </a:xfrm>
+          <a:prstGeom prst="ellipse">
+            <a:avLst/>
+          </a:prstGeom>
+          <a:solidFill>
+            <a:schemeClr val="tx1"/>
+          </a:solidFill>
+          <a:ln>
+            <a:solidFill>
+              <a:schemeClr val="tx1"/>
+            </a:solidFill>
+          </a:ln>
+        </p:spPr>
+        <p:style>
+          <a:lnRef idx="2">
+            <a:schemeClr val="accent1">
+              <a:shade val="50000"/>
+            </a:schemeClr>
+          </a:lnRef>
+          <a:fillRef idx="1">
+            <a:schemeClr val="accent1"/>
+          </a:fillRef>
+          <a:effectRef idx="0">
+            <a:schemeClr val="accent1"/>
+          </a:effectRef>
+          <a:fontRef idx="minor">
+            <a:schemeClr val="lt1"/>
+          </a:fontRef>
+        </p:style>
+        <p:txBody>
+          <a:bodyPr rtlCol="0" anchor="ctr"/>
+          <a:lstStyle/>
+          <a:p>
+            <a:pPr algn="ctr"/>
+            <a:endParaRPr lang="en-US"/>
+          </a:p>
+        </p:txBody>
+      </p:sp>
+      <p:sp>
+        <p:nvSpPr>
+          <p:cNvPr id="57" name="Oval 56"/>
+          <p:cNvSpPr/>
+          <p:nvPr/>
+        </p:nvSpPr>
+        <p:spPr>
+          <a:xfrm>
+            <a:off x="5562600" y="1828800"/>
+            <a:ext cx="152400" cy="152400"/>
+          </a:xfrm>
+          <a:prstGeom prst="ellipse">
+            <a:avLst/>
+          </a:prstGeom>
+          <a:solidFill>
+            <a:schemeClr val="tx1"/>
+          </a:solidFill>
+          <a:ln>
+            <a:solidFill>
+              <a:schemeClr val="tx1"/>
+            </a:solidFill>
+          </a:ln>
+        </p:spPr>
+        <p:style>
+          <a:lnRef idx="2">
+            <a:schemeClr val="accent1">
+              <a:shade val="50000"/>
+            </a:schemeClr>
+          </a:lnRef>
+          <a:fillRef idx="1">
+            <a:schemeClr val="accent1"/>
+          </a:fillRef>
+          <a:effectRef idx="0">
+            <a:schemeClr val="accent1"/>
+          </a:effectRef>
+          <a:fontRef idx="minor">
+            <a:schemeClr val="lt1"/>
+          </a:fontRef>
+        </p:style>
+        <p:txBody>
+          <a:bodyPr rtlCol="0" anchor="ctr"/>
+          <a:lstStyle/>
+          <a:p>
+            <a:pPr algn="ctr"/>
+            <a:endParaRPr lang="en-US"/>
+          </a:p>
+        </p:txBody>
+      </p:sp>
+      <p:sp>
+        <p:nvSpPr>
+          <p:cNvPr id="58" name="Oval 57"/>
+          <p:cNvSpPr/>
+          <p:nvPr/>
+        </p:nvSpPr>
+        <p:spPr>
+          <a:xfrm>
+            <a:off x="2819400" y="4572000"/>
+            <a:ext cx="152400" cy="152400"/>
+          </a:xfrm>
+          <a:prstGeom prst="ellipse">
+            <a:avLst/>
+          </a:prstGeom>
+          <a:solidFill>
+            <a:schemeClr val="tx1"/>
+          </a:solidFill>
+          <a:ln>
+            <a:solidFill>
+              <a:schemeClr val="tx1"/>
+            </a:solidFill>
+          </a:ln>
+        </p:spPr>
+        <p:style>
+          <a:lnRef idx="2">
+            <a:schemeClr val="accent1">
+              <a:shade val="50000"/>
+            </a:schemeClr>
+          </a:lnRef>
+          <a:fillRef idx="1">
+            <a:schemeClr val="accent1"/>
+          </a:fillRef>
+          <a:effectRef idx="0">
+            <a:schemeClr val="accent1"/>
+          </a:effectRef>
+          <a:fontRef idx="minor">
+            <a:schemeClr val="lt1"/>
+          </a:fontRef>
+        </p:style>
+        <p:txBody>
+          <a:bodyPr rtlCol="0" anchor="ctr"/>
+          <a:lstStyle/>
+          <a:p>
+            <a:pPr algn="ctr"/>
+            <a:endParaRPr lang="en-US"/>
+          </a:p>
+        </p:txBody>
+      </p:sp>
+      <p:sp>
+        <p:nvSpPr>
+          <p:cNvPr id="59" name="Oval 58"/>
+          <p:cNvSpPr/>
+          <p:nvPr/>
+        </p:nvSpPr>
+        <p:spPr>
+          <a:xfrm>
+            <a:off x="5562600" y="4572000"/>
+            <a:ext cx="152400" cy="152400"/>
+          </a:xfrm>
+          <a:prstGeom prst="ellipse">
+            <a:avLst/>
+          </a:prstGeom>
+          <a:solidFill>
+            <a:schemeClr val="tx1"/>
+          </a:solidFill>
+          <a:ln>
+            <a:solidFill>
+              <a:schemeClr val="tx1"/>
+            </a:solidFill>
+          </a:ln>
+        </p:spPr>
+        <p:style>
+          <a:lnRef idx="2">
+            <a:schemeClr val="accent1">
+              <a:shade val="50000"/>
+            </a:schemeClr>
+          </a:lnRef>
+          <a:fillRef idx="1">
+            <a:schemeClr val="accent1"/>
+          </a:fillRef>
+          <a:effectRef idx="0">
+            <a:schemeClr val="accent1"/>
+          </a:effectRef>
+          <a:fontRef idx="minor">
+            <a:schemeClr val="lt1"/>
+          </a:fontRef>
+        </p:style>
+        <p:txBody>
+          <a:bodyPr rtlCol="0" anchor="ctr"/>
+          <a:lstStyle/>
+          <a:p>
+            <a:pPr algn="ctr"/>
+            <a:endParaRPr lang="en-US"/>
+          </a:p>
+        </p:txBody>
+      </p:sp>
+      <p:cxnSp>
+        <p:nvCxnSpPr>
+          <p:cNvPr id="8" name="Straight Connector 7"/>
+          <p:cNvCxnSpPr/>
+          <p:nvPr/>
+        </p:nvCxnSpPr>
+        <p:spPr>
+          <a:xfrm flipH="1">
+            <a:off x="1914489" y="1913617"/>
+            <a:ext cx="990600" cy="1371600"/>
+          </a:xfrm>
+          <a:prstGeom prst="line">
+            <a:avLst/>
+          </a:prstGeom>
+          <a:ln w="25400">
+            <a:solidFill>
+              <a:schemeClr val="tx1"/>
+            </a:solidFill>
+          </a:ln>
+        </p:spPr>
+        <p:style>
+          <a:lnRef idx="1">
+            <a:schemeClr val="accent1"/>
+          </a:lnRef>
+          <a:fillRef idx="0">
+            <a:schemeClr val="accent1"/>
+          </a:fillRef>
+          <a:effectRef idx="0">
+            <a:schemeClr val="accent1"/>
+          </a:effectRef>
+          <a:fontRef idx="minor">
+            <a:schemeClr val="tx1"/>
+          </a:fontRef>
+        </p:style>
+      </p:cxnSp>
+      <p:cxnSp>
+        <p:nvCxnSpPr>
+          <p:cNvPr id="61" name="Straight Connector 60"/>
+          <p:cNvCxnSpPr/>
+          <p:nvPr/>
+        </p:nvCxnSpPr>
+        <p:spPr>
+          <a:xfrm flipH="1">
+            <a:off x="4648200" y="1890665"/>
+            <a:ext cx="990600" cy="1371600"/>
+          </a:xfrm>
+          <a:prstGeom prst="line">
+            <a:avLst/>
+          </a:prstGeom>
+          <a:ln w="25400">
+            <a:solidFill>
+              <a:schemeClr val="tx1"/>
+            </a:solidFill>
+          </a:ln>
+        </p:spPr>
+        <p:style>
+          <a:lnRef idx="1">
+            <a:schemeClr val="accent1"/>
+          </a:lnRef>
+          <a:fillRef idx="0">
+            <a:schemeClr val="accent1"/>
+          </a:fillRef>
+          <a:effectRef idx="0">
+            <a:schemeClr val="accent1"/>
+          </a:effectRef>
+          <a:fontRef idx="minor">
+            <a:schemeClr val="tx1"/>
+          </a:fontRef>
+        </p:style>
+      </p:cxnSp>
+      <p:cxnSp>
+        <p:nvCxnSpPr>
+          <p:cNvPr id="62" name="Straight Connector 61"/>
+          <p:cNvCxnSpPr/>
+          <p:nvPr/>
+        </p:nvCxnSpPr>
+        <p:spPr>
+          <a:xfrm flipH="1">
+            <a:off x="4648200" y="4667061"/>
+            <a:ext cx="990600" cy="1371600"/>
+          </a:xfrm>
+          <a:prstGeom prst="line">
+            <a:avLst/>
+          </a:prstGeom>
+          <a:ln w="25400">
+            <a:solidFill>
+              <a:schemeClr val="tx1"/>
+            </a:solidFill>
+          </a:ln>
+        </p:spPr>
+        <p:style>
+          <a:lnRef idx="1">
+            <a:schemeClr val="accent1"/>
+          </a:lnRef>
+          <a:fillRef idx="0">
+            <a:schemeClr val="accent1"/>
+          </a:fillRef>
+          <a:effectRef idx="0">
+            <a:schemeClr val="accent1"/>
+          </a:effectRef>
+          <a:fontRef idx="minor">
+            <a:schemeClr val="tx1"/>
+          </a:fontRef>
+        </p:style>
+      </p:cxnSp>
+      <p:cxnSp>
+        <p:nvCxnSpPr>
+          <p:cNvPr id="63" name="Straight Connector 62"/>
+          <p:cNvCxnSpPr/>
+          <p:nvPr/>
+        </p:nvCxnSpPr>
+        <p:spPr>
+          <a:xfrm flipH="1">
+            <a:off x="1927315" y="4621794"/>
+            <a:ext cx="990600" cy="1371600"/>
+          </a:xfrm>
+          <a:prstGeom prst="line">
+            <a:avLst/>
+          </a:prstGeom>
+          <a:ln w="25400">
+            <a:solidFill>
+              <a:schemeClr val="tx1"/>
+            </a:solidFill>
+            <a:prstDash val="dash"/>
+          </a:ln>
+        </p:spPr>
+        <p:style>
+          <a:lnRef idx="1">
+            <a:schemeClr val="accent1"/>
+          </a:lnRef>
+          <a:fillRef idx="0">
+            <a:schemeClr val="accent1"/>
+          </a:fillRef>
+          <a:effectRef idx="0">
+            <a:schemeClr val="accent1"/>
+          </a:effectRef>
+          <a:fontRef idx="minor">
+            <a:schemeClr val="tx1"/>
+          </a:fontRef>
+        </p:style>
+      </p:cxnSp>
+      <p:cxnSp>
+        <p:nvCxnSpPr>
+          <p:cNvPr id="64" name="Straight Connector 63"/>
+          <p:cNvCxnSpPr>
+            <a:stCxn id="55" idx="2"/>
+            <a:endCxn id="54" idx="2"/>
+          </p:cNvCxnSpPr>
+          <p:nvPr/>
+        </p:nvCxnSpPr>
+        <p:spPr>
+          <a:xfrm flipH="1">
+            <a:off x="1828800" y="6019800"/>
+            <a:ext cx="2743200" cy="0"/>
+          </a:xfrm>
+          <a:prstGeom prst="line">
+            <a:avLst/>
+          </a:prstGeom>
+          <a:ln w="25400">
+            <a:solidFill>
+              <a:schemeClr val="tx1"/>
+            </a:solidFill>
+          </a:ln>
+        </p:spPr>
+        <p:style>
+          <a:lnRef idx="1">
+            <a:schemeClr val="accent1"/>
+          </a:lnRef>
+          <a:fillRef idx="0">
+            <a:schemeClr val="accent1"/>
+          </a:fillRef>
+          <a:effectRef idx="0">
+            <a:schemeClr val="accent1"/>
+          </a:effectRef>
+          <a:fontRef idx="minor">
+            <a:schemeClr val="tx1"/>
+          </a:fontRef>
+        </p:style>
+      </p:cxnSp>
+      <p:cxnSp>
+        <p:nvCxnSpPr>
+          <p:cNvPr id="65" name="Straight Connector 64"/>
+          <p:cNvCxnSpPr/>
+          <p:nvPr/>
+        </p:nvCxnSpPr>
+        <p:spPr>
+          <a:xfrm flipH="1">
+            <a:off x="1914489" y="3285217"/>
+            <a:ext cx="2743200" cy="0"/>
+          </a:xfrm>
+          <a:prstGeom prst="line">
+            <a:avLst/>
+          </a:prstGeom>
+          <a:ln w="25400">
+            <a:solidFill>
+              <a:schemeClr val="tx1"/>
+            </a:solidFill>
+          </a:ln>
+        </p:spPr>
+        <p:style>
+          <a:lnRef idx="1">
+            <a:schemeClr val="accent1"/>
+          </a:lnRef>
+          <a:fillRef idx="0">
+            <a:schemeClr val="accent1"/>
+          </a:fillRef>
+          <a:effectRef idx="0">
+            <a:schemeClr val="accent1"/>
+          </a:effectRef>
+          <a:fontRef idx="minor">
+            <a:schemeClr val="tx1"/>
+          </a:fontRef>
+        </p:style>
+      </p:cxnSp>
+      <p:cxnSp>
+        <p:nvCxnSpPr>
+          <p:cNvPr id="66" name="Straight Connector 65"/>
+          <p:cNvCxnSpPr/>
+          <p:nvPr/>
+        </p:nvCxnSpPr>
+        <p:spPr>
+          <a:xfrm flipH="1">
+            <a:off x="2895600" y="1913617"/>
+            <a:ext cx="2743200" cy="0"/>
+          </a:xfrm>
+          <a:prstGeom prst="line">
+            <a:avLst/>
+          </a:prstGeom>
+          <a:ln w="25400">
+            <a:solidFill>
+              <a:schemeClr val="tx1"/>
+            </a:solidFill>
+          </a:ln>
+        </p:spPr>
+        <p:style>
+          <a:lnRef idx="1">
+            <a:schemeClr val="accent1"/>
+          </a:lnRef>
+          <a:fillRef idx="0">
+            <a:schemeClr val="accent1"/>
+          </a:fillRef>
+          <a:effectRef idx="0">
+            <a:schemeClr val="accent1"/>
+          </a:effectRef>
+          <a:fontRef idx="minor">
+            <a:schemeClr val="tx1"/>
+          </a:fontRef>
+        </p:style>
+      </p:cxnSp>
+      <p:cxnSp>
+        <p:nvCxnSpPr>
+          <p:cNvPr id="67" name="Straight Connector 66"/>
+          <p:cNvCxnSpPr/>
+          <p:nvPr/>
+        </p:nvCxnSpPr>
+        <p:spPr>
+          <a:xfrm flipH="1">
+            <a:off x="2917915" y="4648200"/>
+            <a:ext cx="2743200" cy="0"/>
+          </a:xfrm>
+          <a:prstGeom prst="line">
+            <a:avLst/>
+          </a:prstGeom>
+          <a:ln w="25400">
+            <a:solidFill>
+              <a:schemeClr val="tx1"/>
+            </a:solidFill>
+            <a:prstDash val="dash"/>
+          </a:ln>
+        </p:spPr>
+        <p:style>
+          <a:lnRef idx="1">
+            <a:schemeClr val="accent1"/>
+          </a:lnRef>
+          <a:fillRef idx="0">
+            <a:schemeClr val="accent1"/>
+          </a:fillRef>
+          <a:effectRef idx="0">
+            <a:schemeClr val="accent1"/>
+          </a:effectRef>
+          <a:fontRef idx="minor">
+            <a:schemeClr val="tx1"/>
+          </a:fontRef>
+        </p:style>
+      </p:cxnSp>
+      <p:cxnSp>
+        <p:nvCxnSpPr>
+          <p:cNvPr id="68" name="Straight Connector 67"/>
+          <p:cNvCxnSpPr>
+            <a:stCxn id="23" idx="4"/>
+            <a:endCxn id="54" idx="0"/>
+          </p:cNvCxnSpPr>
+          <p:nvPr/>
+        </p:nvCxnSpPr>
+        <p:spPr>
+          <a:xfrm>
+            <a:off x="1905000" y="3352800"/>
+            <a:ext cx="0" cy="2590800"/>
+          </a:xfrm>
+          <a:prstGeom prst="line">
+            <a:avLst/>
+          </a:prstGeom>
+          <a:ln w="25400">
+            <a:solidFill>
+              <a:schemeClr val="tx1"/>
+            </a:solidFill>
+          </a:ln>
+        </p:spPr>
+        <p:style>
+          <a:lnRef idx="1">
+            <a:schemeClr val="accent1"/>
+          </a:lnRef>
+          <a:fillRef idx="0">
+            <a:schemeClr val="accent1"/>
+          </a:fillRef>
+          <a:effectRef idx="0">
+            <a:schemeClr val="accent1"/>
+          </a:effectRef>
+          <a:fontRef idx="minor">
+            <a:schemeClr val="tx1"/>
+          </a:fontRef>
+        </p:style>
+      </p:cxnSp>
+      <p:cxnSp>
+        <p:nvCxnSpPr>
+          <p:cNvPr id="69" name="Straight Connector 68"/>
+          <p:cNvCxnSpPr/>
+          <p:nvPr/>
+        </p:nvCxnSpPr>
+        <p:spPr>
+          <a:xfrm>
+            <a:off x="2895600" y="1981200"/>
+            <a:ext cx="0" cy="2590800"/>
+          </a:xfrm>
+          <a:prstGeom prst="line">
+            <a:avLst/>
+          </a:prstGeom>
+          <a:ln w="25400">
+            <a:solidFill>
+              <a:schemeClr val="tx1"/>
+            </a:solidFill>
+            <a:prstDash val="dash"/>
+          </a:ln>
+        </p:spPr>
+        <p:style>
+          <a:lnRef idx="1">
+            <a:schemeClr val="accent1"/>
+          </a:lnRef>
+          <a:fillRef idx="0">
+            <a:schemeClr val="accent1"/>
+          </a:fillRef>
+          <a:effectRef idx="0">
+            <a:schemeClr val="accent1"/>
+          </a:effectRef>
+          <a:fontRef idx="minor">
+            <a:schemeClr val="tx1"/>
+          </a:fontRef>
+        </p:style>
+      </p:cxnSp>
+      <p:cxnSp>
+        <p:nvCxnSpPr>
+          <p:cNvPr id="70" name="Straight Connector 69"/>
+          <p:cNvCxnSpPr/>
+          <p:nvPr/>
+        </p:nvCxnSpPr>
+        <p:spPr>
+          <a:xfrm>
+            <a:off x="5638800" y="1966865"/>
+            <a:ext cx="0" cy="2590800"/>
+          </a:xfrm>
+          <a:prstGeom prst="line">
+            <a:avLst/>
+          </a:prstGeom>
+          <a:ln w="25400">
+            <a:solidFill>
+              <a:schemeClr val="tx1"/>
+            </a:solidFill>
+          </a:ln>
+        </p:spPr>
+        <p:style>
+          <a:lnRef idx="1">
+            <a:schemeClr val="accent1"/>
+          </a:lnRef>
+          <a:fillRef idx="0">
+            <a:schemeClr val="accent1"/>
+          </a:fillRef>
+          <a:effectRef idx="0">
+            <a:schemeClr val="accent1"/>
+          </a:effectRef>
+          <a:fontRef idx="minor">
+            <a:schemeClr val="tx1"/>
+          </a:fontRef>
+        </p:style>
+      </p:cxnSp>
+      <p:cxnSp>
+        <p:nvCxnSpPr>
+          <p:cNvPr id="71" name="Straight Connector 70"/>
+          <p:cNvCxnSpPr/>
+          <p:nvPr/>
+        </p:nvCxnSpPr>
+        <p:spPr>
+          <a:xfrm>
+            <a:off x="4657689" y="3352800"/>
+            <a:ext cx="0" cy="2590800"/>
+          </a:xfrm>
+          <a:prstGeom prst="line">
+            <a:avLst/>
+          </a:prstGeom>
+          <a:ln w="25400">
+            <a:solidFill>
+              <a:schemeClr val="tx1"/>
+            </a:solidFill>
+          </a:ln>
+        </p:spPr>
+        <p:style>
+          <a:lnRef idx="1">
+            <a:schemeClr val="accent1"/>
+          </a:lnRef>
+          <a:fillRef idx="0">
+            <a:schemeClr val="accent1"/>
+          </a:fillRef>
+          <a:effectRef idx="0">
+            <a:schemeClr val="accent1"/>
+          </a:effectRef>
+          <a:fontRef idx="minor">
+            <a:schemeClr val="tx1"/>
+          </a:fontRef>
+        </p:style>
+      </p:cxnSp>
+      <p:sp>
+        <p:nvSpPr>
+          <p:cNvPr id="20" name="TextBox 19"/>
+          <p:cNvSpPr txBox="1"/>
+          <p:nvPr/>
+        </p:nvSpPr>
+        <p:spPr>
+          <a:xfrm>
+            <a:off x="1346720" y="6019800"/>
+            <a:ext cx="405880" cy="369332"/>
+          </a:xfrm>
+          <a:prstGeom prst="rect">
+            <a:avLst/>
+          </a:prstGeom>
+          <a:noFill/>
+        </p:spPr>
+        <p:txBody>
+          <a:bodyPr wrap="none" rtlCol="0">
+            <a:spAutoFit/>
+          </a:bodyPr>
+          <a:lstStyle/>
+          <a:p>
+            <a:r>
+              <a:rPr lang="en-US" dirty="0" smtClean="0"/>
+              <a:t>v0</a:t>
+            </a:r>
+            <a:endParaRPr lang="en-US" dirty="0"/>
+          </a:p>
+        </p:txBody>
+      </p:sp>
+      <p:sp>
+        <p:nvSpPr>
+          <p:cNvPr id="72" name="TextBox 71"/>
+          <p:cNvSpPr txBox="1"/>
+          <p:nvPr/>
+        </p:nvSpPr>
+        <p:spPr>
+          <a:xfrm>
+            <a:off x="2413520" y="1791252"/>
+            <a:ext cx="405880" cy="369332"/>
+          </a:xfrm>
+          <a:prstGeom prst="rect">
+            <a:avLst/>
+          </a:prstGeom>
+          <a:noFill/>
+        </p:spPr>
+        <p:txBody>
+          <a:bodyPr wrap="none" rtlCol="0">
+            <a:spAutoFit/>
+          </a:bodyPr>
+          <a:lstStyle/>
+          <a:p>
+            <a:r>
+              <a:rPr lang="en-US" dirty="0" smtClean="0"/>
+              <a:t>v6</a:t>
+            </a:r>
+            <a:endParaRPr lang="en-US" dirty="0"/>
+          </a:p>
+        </p:txBody>
+      </p:sp>
+      <p:sp>
+        <p:nvSpPr>
+          <p:cNvPr id="73" name="TextBox 72"/>
+          <p:cNvSpPr txBox="1"/>
+          <p:nvPr/>
+        </p:nvSpPr>
+        <p:spPr>
+          <a:xfrm>
+            <a:off x="5766320" y="1782199"/>
+            <a:ext cx="405880" cy="369332"/>
+          </a:xfrm>
+          <a:prstGeom prst="rect">
+            <a:avLst/>
+          </a:prstGeom>
+          <a:noFill/>
+        </p:spPr>
+        <p:txBody>
+          <a:bodyPr wrap="none" rtlCol="0">
+            <a:spAutoFit/>
+          </a:bodyPr>
+          <a:lstStyle/>
+          <a:p>
+            <a:r>
+              <a:rPr lang="en-US" dirty="0" smtClean="0"/>
+              <a:t>v7</a:t>
+            </a:r>
+            <a:endParaRPr lang="en-US" dirty="0"/>
+          </a:p>
+        </p:txBody>
+      </p:sp>
+      <p:sp>
+        <p:nvSpPr>
+          <p:cNvPr id="74" name="TextBox 73"/>
+          <p:cNvSpPr txBox="1"/>
+          <p:nvPr/>
+        </p:nvSpPr>
+        <p:spPr>
+          <a:xfrm>
+            <a:off x="4737620" y="3048000"/>
+            <a:ext cx="405880" cy="369332"/>
+          </a:xfrm>
+          <a:prstGeom prst="rect">
+            <a:avLst/>
+          </a:prstGeom>
+          <a:noFill/>
+        </p:spPr>
+        <p:txBody>
+          <a:bodyPr wrap="none" rtlCol="0">
+            <a:spAutoFit/>
+          </a:bodyPr>
+          <a:lstStyle/>
+          <a:p>
+            <a:r>
+              <a:rPr lang="en-US" dirty="0" smtClean="0"/>
+              <a:t>v5</a:t>
+            </a:r>
+            <a:endParaRPr lang="en-US" dirty="0"/>
+          </a:p>
+        </p:txBody>
+      </p:sp>
+      <p:sp>
+        <p:nvSpPr>
+          <p:cNvPr id="75" name="TextBox 74"/>
+          <p:cNvSpPr txBox="1"/>
+          <p:nvPr/>
+        </p:nvSpPr>
+        <p:spPr>
+          <a:xfrm>
+            <a:off x="1346720" y="3048000"/>
+            <a:ext cx="405880" cy="369332"/>
+          </a:xfrm>
+          <a:prstGeom prst="rect">
+            <a:avLst/>
+          </a:prstGeom>
+          <a:noFill/>
+        </p:spPr>
+        <p:txBody>
+          <a:bodyPr wrap="none" rtlCol="0">
+            <a:spAutoFit/>
+          </a:bodyPr>
+          <a:lstStyle/>
+          <a:p>
+            <a:r>
+              <a:rPr lang="en-US" dirty="0" smtClean="0"/>
+              <a:t>v4</a:t>
+            </a:r>
+            <a:endParaRPr lang="en-US" dirty="0"/>
+          </a:p>
+        </p:txBody>
+      </p:sp>
+      <p:sp>
+        <p:nvSpPr>
+          <p:cNvPr id="76" name="TextBox 75"/>
+          <p:cNvSpPr txBox="1"/>
+          <p:nvPr/>
+        </p:nvSpPr>
+        <p:spPr>
+          <a:xfrm>
+            <a:off x="2413520" y="4431268"/>
+            <a:ext cx="405880" cy="369332"/>
+          </a:xfrm>
+          <a:prstGeom prst="rect">
+            <a:avLst/>
+          </a:prstGeom>
+          <a:noFill/>
+        </p:spPr>
+        <p:txBody>
+          <a:bodyPr wrap="none" rtlCol="0">
+            <a:spAutoFit/>
+          </a:bodyPr>
+          <a:lstStyle/>
+          <a:p>
+            <a:r>
+              <a:rPr lang="en-US" dirty="0" smtClean="0"/>
+              <a:t>v2</a:t>
+            </a:r>
+            <a:endParaRPr lang="en-US" dirty="0"/>
+          </a:p>
+        </p:txBody>
+      </p:sp>
+      <p:sp>
+        <p:nvSpPr>
+          <p:cNvPr id="77" name="TextBox 76"/>
+          <p:cNvSpPr txBox="1"/>
+          <p:nvPr/>
+        </p:nvSpPr>
+        <p:spPr>
+          <a:xfrm>
+            <a:off x="5766320" y="4507468"/>
+            <a:ext cx="405880" cy="369332"/>
+          </a:xfrm>
+          <a:prstGeom prst="rect">
+            <a:avLst/>
+          </a:prstGeom>
+          <a:noFill/>
+        </p:spPr>
+        <p:txBody>
+          <a:bodyPr wrap="none" rtlCol="0">
+            <a:spAutoFit/>
+          </a:bodyPr>
+          <a:lstStyle/>
+          <a:p>
+            <a:r>
+              <a:rPr lang="en-US" dirty="0" smtClean="0"/>
+              <a:t>v3</a:t>
+            </a:r>
+            <a:endParaRPr lang="en-US" dirty="0"/>
+          </a:p>
+        </p:txBody>
+      </p:sp>
+      <p:sp>
+        <p:nvSpPr>
+          <p:cNvPr id="78" name="TextBox 77"/>
+          <p:cNvSpPr txBox="1"/>
+          <p:nvPr/>
+        </p:nvSpPr>
+        <p:spPr>
+          <a:xfrm>
+            <a:off x="4737620" y="6009416"/>
+            <a:ext cx="405880" cy="369332"/>
+          </a:xfrm>
+          <a:prstGeom prst="rect">
+            <a:avLst/>
+          </a:prstGeom>
+          <a:noFill/>
+        </p:spPr>
+        <p:txBody>
+          <a:bodyPr wrap="none" rtlCol="0">
+            <a:spAutoFit/>
+          </a:bodyPr>
+          <a:lstStyle/>
+          <a:p>
+            <a:r>
+              <a:rPr lang="en-US" dirty="0" smtClean="0"/>
+              <a:t>v1</a:t>
+            </a:r>
+            <a:endParaRPr lang="en-US" dirty="0"/>
+          </a:p>
+        </p:txBody>
+      </p:sp>
+      <p:sp>
+        <p:nvSpPr>
+          <p:cNvPr id="79" name="TextBox 78"/>
+          <p:cNvSpPr txBox="1"/>
+          <p:nvPr/>
+        </p:nvSpPr>
+        <p:spPr>
+          <a:xfrm>
+            <a:off x="4916898" y="2436512"/>
+            <a:ext cx="417102" cy="369332"/>
+          </a:xfrm>
+          <a:prstGeom prst="rect">
+            <a:avLst/>
+          </a:prstGeom>
+          <a:solidFill>
+            <a:schemeClr val="bg1"/>
+          </a:solidFill>
+        </p:spPr>
+        <p:txBody>
+          <a:bodyPr wrap="none" rtlCol="0">
+            <a:spAutoFit/>
+          </a:bodyPr>
+          <a:lstStyle/>
+          <a:p>
+            <a:r>
+              <a:rPr lang="en-US" dirty="0" smtClean="0"/>
+              <a:t>e3</a:t>
+            </a:r>
+            <a:endParaRPr lang="en-US" dirty="0"/>
+          </a:p>
+        </p:txBody>
+      </p:sp>
+      <p:sp>
+        <p:nvSpPr>
+          <p:cNvPr id="80" name="TextBox 79"/>
+          <p:cNvSpPr txBox="1"/>
+          <p:nvPr/>
+        </p:nvSpPr>
+        <p:spPr>
+          <a:xfrm>
+            <a:off x="2133600" y="2436512"/>
+            <a:ext cx="417102" cy="369332"/>
+          </a:xfrm>
+          <a:prstGeom prst="rect">
+            <a:avLst/>
+          </a:prstGeom>
+          <a:solidFill>
+            <a:schemeClr val="bg1"/>
+          </a:solidFill>
+        </p:spPr>
+        <p:txBody>
+          <a:bodyPr wrap="none" rtlCol="0">
+            <a:spAutoFit/>
+          </a:bodyPr>
+          <a:lstStyle/>
+          <a:p>
+            <a:r>
+              <a:rPr lang="en-US" dirty="0" smtClean="0"/>
+              <a:t>e2</a:t>
+            </a:r>
+            <a:endParaRPr lang="en-US" dirty="0"/>
+          </a:p>
+        </p:txBody>
+      </p:sp>
+      <p:sp>
+        <p:nvSpPr>
+          <p:cNvPr id="81" name="TextBox 80"/>
+          <p:cNvSpPr txBox="1"/>
+          <p:nvPr/>
+        </p:nvSpPr>
+        <p:spPr>
+          <a:xfrm>
+            <a:off x="5029200" y="5029200"/>
+            <a:ext cx="417102" cy="369332"/>
+          </a:xfrm>
+          <a:prstGeom prst="rect">
+            <a:avLst/>
+          </a:prstGeom>
+          <a:solidFill>
+            <a:schemeClr val="bg1"/>
+          </a:solidFill>
+        </p:spPr>
+        <p:txBody>
+          <a:bodyPr wrap="none" rtlCol="0">
+            <a:spAutoFit/>
+          </a:bodyPr>
+          <a:lstStyle/>
+          <a:p>
+            <a:r>
+              <a:rPr lang="en-US" dirty="0" smtClean="0"/>
+              <a:t>e1</a:t>
+            </a:r>
+            <a:endParaRPr lang="en-US" dirty="0"/>
+          </a:p>
+        </p:txBody>
+      </p:sp>
+      <p:sp>
+        <p:nvSpPr>
+          <p:cNvPr id="82" name="TextBox 81"/>
+          <p:cNvSpPr txBox="1"/>
+          <p:nvPr/>
+        </p:nvSpPr>
+        <p:spPr>
+          <a:xfrm>
+            <a:off x="2286000" y="5029200"/>
+            <a:ext cx="417102" cy="369332"/>
+          </a:xfrm>
+          <a:prstGeom prst="rect">
+            <a:avLst/>
+          </a:prstGeom>
+          <a:solidFill>
+            <a:schemeClr val="bg1"/>
+          </a:solidFill>
+        </p:spPr>
+        <p:txBody>
+          <a:bodyPr wrap="none" rtlCol="0">
+            <a:spAutoFit/>
+          </a:bodyPr>
+          <a:lstStyle/>
+          <a:p>
+            <a:r>
+              <a:rPr lang="en-US" dirty="0" smtClean="0"/>
+              <a:t>e0</a:t>
+            </a:r>
+            <a:endParaRPr lang="en-US" dirty="0"/>
+          </a:p>
+        </p:txBody>
+      </p:sp>
+      <p:sp>
+        <p:nvSpPr>
+          <p:cNvPr id="83" name="TextBox 82"/>
+          <p:cNvSpPr txBox="1"/>
+          <p:nvPr/>
+        </p:nvSpPr>
+        <p:spPr>
+          <a:xfrm>
+            <a:off x="3993445" y="1752600"/>
+            <a:ext cx="417102" cy="369332"/>
+          </a:xfrm>
+          <a:prstGeom prst="rect">
+            <a:avLst/>
+          </a:prstGeom>
+          <a:solidFill>
+            <a:schemeClr val="bg1"/>
+          </a:solidFill>
+        </p:spPr>
+        <p:txBody>
+          <a:bodyPr wrap="none" rtlCol="0">
+            <a:spAutoFit/>
+          </a:bodyPr>
+          <a:lstStyle/>
+          <a:p>
+            <a:r>
+              <a:rPr lang="en-US" dirty="0" smtClean="0"/>
+              <a:t>e7</a:t>
+            </a:r>
+            <a:endParaRPr lang="en-US" dirty="0"/>
+          </a:p>
+        </p:txBody>
+      </p:sp>
+      <p:sp>
+        <p:nvSpPr>
+          <p:cNvPr id="84" name="TextBox 83"/>
+          <p:cNvSpPr txBox="1"/>
+          <p:nvPr/>
+        </p:nvSpPr>
+        <p:spPr>
+          <a:xfrm>
+            <a:off x="3926188" y="4446759"/>
+            <a:ext cx="417102" cy="369332"/>
+          </a:xfrm>
+          <a:prstGeom prst="rect">
+            <a:avLst/>
+          </a:prstGeom>
+          <a:solidFill>
+            <a:schemeClr val="bg1"/>
+          </a:solidFill>
+        </p:spPr>
+        <p:txBody>
+          <a:bodyPr wrap="none" rtlCol="0">
+            <a:spAutoFit/>
+          </a:bodyPr>
+          <a:lstStyle/>
+          <a:p>
+            <a:r>
+              <a:rPr lang="en-US" dirty="0" smtClean="0"/>
+              <a:t>e5</a:t>
+            </a:r>
+            <a:endParaRPr lang="en-US" dirty="0"/>
+          </a:p>
+        </p:txBody>
+      </p:sp>
+      <p:sp>
+        <p:nvSpPr>
+          <p:cNvPr id="85" name="TextBox 84"/>
+          <p:cNvSpPr txBox="1"/>
+          <p:nvPr/>
+        </p:nvSpPr>
+        <p:spPr>
+          <a:xfrm>
+            <a:off x="3011898" y="3124200"/>
+            <a:ext cx="417102" cy="369332"/>
+          </a:xfrm>
+          <a:prstGeom prst="rect">
+            <a:avLst/>
+          </a:prstGeom>
+          <a:solidFill>
+            <a:schemeClr val="bg1"/>
+          </a:solidFill>
+        </p:spPr>
+        <p:txBody>
+          <a:bodyPr wrap="none" rtlCol="0">
+            <a:spAutoFit/>
+          </a:bodyPr>
+          <a:lstStyle/>
+          <a:p>
+            <a:r>
+              <a:rPr lang="en-US" dirty="0" smtClean="0"/>
+              <a:t>e6</a:t>
+            </a:r>
+            <a:endParaRPr lang="en-US" dirty="0"/>
+          </a:p>
+        </p:txBody>
+      </p:sp>
+      <p:sp>
+        <p:nvSpPr>
+          <p:cNvPr id="86" name="TextBox 85"/>
+          <p:cNvSpPr txBox="1"/>
+          <p:nvPr/>
+        </p:nvSpPr>
+        <p:spPr>
+          <a:xfrm>
+            <a:off x="2949918" y="5809306"/>
+            <a:ext cx="417102" cy="369332"/>
+          </a:xfrm>
+          <a:prstGeom prst="rect">
+            <a:avLst/>
+          </a:prstGeom>
+          <a:solidFill>
+            <a:schemeClr val="bg1"/>
+          </a:solidFill>
+        </p:spPr>
+        <p:txBody>
+          <a:bodyPr wrap="none" rtlCol="0">
+            <a:spAutoFit/>
+          </a:bodyPr>
+          <a:lstStyle/>
+          <a:p>
+            <a:r>
+              <a:rPr lang="en-US" dirty="0" smtClean="0"/>
+              <a:t>e4</a:t>
+            </a:r>
+            <a:endParaRPr lang="en-US" dirty="0"/>
+          </a:p>
+        </p:txBody>
+      </p:sp>
+      <p:sp>
+        <p:nvSpPr>
+          <p:cNvPr id="87" name="TextBox 86"/>
+          <p:cNvSpPr txBox="1"/>
+          <p:nvPr/>
+        </p:nvSpPr>
+        <p:spPr>
+          <a:xfrm>
+            <a:off x="5410200" y="3745468"/>
+            <a:ext cx="534121" cy="369332"/>
+          </a:xfrm>
+          <a:prstGeom prst="rect">
+            <a:avLst/>
+          </a:prstGeom>
+          <a:solidFill>
+            <a:schemeClr val="bg1"/>
+          </a:solidFill>
+        </p:spPr>
+        <p:txBody>
+          <a:bodyPr wrap="none" rtlCol="0">
+            <a:spAutoFit/>
+          </a:bodyPr>
+          <a:lstStyle/>
+          <a:p>
+            <a:r>
+              <a:rPr lang="en-US" dirty="0" smtClean="0"/>
+              <a:t>e11</a:t>
+            </a:r>
+            <a:endParaRPr lang="en-US" dirty="0"/>
+          </a:p>
+        </p:txBody>
+      </p:sp>
+      <p:sp>
+        <p:nvSpPr>
+          <p:cNvPr id="88" name="TextBox 87"/>
+          <p:cNvSpPr txBox="1"/>
+          <p:nvPr/>
+        </p:nvSpPr>
+        <p:spPr>
+          <a:xfrm>
+            <a:off x="2667000" y="3745468"/>
+            <a:ext cx="534121" cy="369332"/>
+          </a:xfrm>
+          <a:prstGeom prst="rect">
+            <a:avLst/>
+          </a:prstGeom>
+          <a:solidFill>
+            <a:schemeClr val="bg1"/>
+          </a:solidFill>
+        </p:spPr>
+        <p:txBody>
+          <a:bodyPr wrap="none" rtlCol="0">
+            <a:spAutoFit/>
+          </a:bodyPr>
+          <a:lstStyle/>
+          <a:p>
+            <a:r>
+              <a:rPr lang="en-US" dirty="0" smtClean="0"/>
+              <a:t>e10</a:t>
+            </a:r>
+            <a:endParaRPr lang="en-US" dirty="0"/>
+          </a:p>
+        </p:txBody>
+      </p:sp>
+      <p:sp>
+        <p:nvSpPr>
+          <p:cNvPr id="89" name="TextBox 88"/>
+          <p:cNvSpPr txBox="1"/>
+          <p:nvPr/>
+        </p:nvSpPr>
+        <p:spPr>
+          <a:xfrm>
+            <a:off x="4459698" y="4800600"/>
+            <a:ext cx="417102" cy="369332"/>
+          </a:xfrm>
+          <a:prstGeom prst="rect">
+            <a:avLst/>
+          </a:prstGeom>
+          <a:solidFill>
+            <a:schemeClr val="bg1"/>
+          </a:solidFill>
+        </p:spPr>
+        <p:txBody>
+          <a:bodyPr wrap="none" rtlCol="0">
+            <a:spAutoFit/>
+          </a:bodyPr>
+          <a:lstStyle/>
+          <a:p>
+            <a:r>
+              <a:rPr lang="en-US" dirty="0" smtClean="0"/>
+              <a:t>e9</a:t>
+            </a:r>
+            <a:endParaRPr lang="en-US" dirty="0"/>
+          </a:p>
+        </p:txBody>
+      </p:sp>
+      <p:sp>
+        <p:nvSpPr>
+          <p:cNvPr id="90" name="TextBox 89"/>
+          <p:cNvSpPr txBox="1"/>
+          <p:nvPr/>
+        </p:nvSpPr>
+        <p:spPr>
+          <a:xfrm>
+            <a:off x="1694506" y="4800600"/>
+            <a:ext cx="417102" cy="369332"/>
+          </a:xfrm>
+          <a:prstGeom prst="rect">
+            <a:avLst/>
+          </a:prstGeom>
+          <a:solidFill>
+            <a:schemeClr val="bg1"/>
+          </a:solidFill>
+        </p:spPr>
+        <p:txBody>
+          <a:bodyPr wrap="none" rtlCol="0">
+            <a:spAutoFit/>
+          </a:bodyPr>
+          <a:lstStyle/>
+          <a:p>
+            <a:r>
+              <a:rPr lang="en-US" dirty="0" smtClean="0"/>
+              <a:t>e8</a:t>
+            </a:r>
+            <a:endParaRPr lang="en-US" dirty="0"/>
+          </a:p>
+        </p:txBody>
+      </p:sp>
+    </p:spTree>
+    <p:extLst>
+      <p:ext uri="{BB962C8B-B14F-4D97-AF65-F5344CB8AC3E}">
+        <p14:creationId xmlns:p14="http://schemas.microsoft.com/office/powerpoint/2010/main" val="2866681430"/>
       </p:ext>
     </p:extLst>
   </p:cSld>

</xml_diff>

<commit_message>
geom notes: update tetra/box intersection notes
Former-commit-id: ec9617fddb98ee4d51542b6a1afdbdbfdbf75ee4 [formerly ecbd41da0268a82a5dbe192dda0d96d30e35a075]
Former-commit-id: ab8d408c60287900461353ff92693c29b6704684
Former-commit-id: 66506ef9704beae3455ec3289285cddd181005f6
</commit_message>
<xml_diff>
--- a/Manuals/SMV_Technical_Reference_Guide/FIGURES/geom_setup.pptx
+++ b/Manuals/SMV_Technical_Reference_Guide/FIGURES/geom_setup.pptx
@@ -8,7 +8,8 @@
     <p:sldId id="256" r:id="rId2"/>
     <p:sldId id="257" r:id="rId3"/>
     <p:sldId id="258" r:id="rId4"/>
-    <p:sldId id="259" r:id="rId5"/>
+    <p:sldId id="260" r:id="rId5"/>
+    <p:sldId id="259" r:id="rId6"/>
   </p:sldIdLst>
   <p:sldSz cx="9144000" cy="6858000" type="screen4x3"/>
   <p:notesSz cx="7315200" cy="9601200"/>
@@ -292,7 +293,7 @@
             <a:fld id="{1D8BD707-D9CF-40AE-B4C6-C98DA3205C09}" type="datetimeFigureOut">
               <a:rPr lang="en-US" smtClean="0"/>
               <a:pPr/>
-              <a:t>10/30/2014</a:t>
+              <a:t>11/16/2014</a:t>
             </a:fld>
             <a:endParaRPr lang="en-US"/>
           </a:p>
@@ -459,7 +460,7 @@
             <a:fld id="{1D8BD707-D9CF-40AE-B4C6-C98DA3205C09}" type="datetimeFigureOut">
               <a:rPr lang="en-US" smtClean="0"/>
               <a:pPr/>
-              <a:t>10/30/2014</a:t>
+              <a:t>11/16/2014</a:t>
             </a:fld>
             <a:endParaRPr lang="en-US"/>
           </a:p>
@@ -636,7 +637,7 @@
             <a:fld id="{1D8BD707-D9CF-40AE-B4C6-C98DA3205C09}" type="datetimeFigureOut">
               <a:rPr lang="en-US" smtClean="0"/>
               <a:pPr/>
-              <a:t>10/30/2014</a:t>
+              <a:t>11/16/2014</a:t>
             </a:fld>
             <a:endParaRPr lang="en-US"/>
           </a:p>
@@ -803,7 +804,7 @@
             <a:fld id="{1D8BD707-D9CF-40AE-B4C6-C98DA3205C09}" type="datetimeFigureOut">
               <a:rPr lang="en-US" smtClean="0"/>
               <a:pPr/>
-              <a:t>10/30/2014</a:t>
+              <a:t>11/16/2014</a:t>
             </a:fld>
             <a:endParaRPr lang="en-US"/>
           </a:p>
@@ -1046,7 +1047,7 @@
             <a:fld id="{1D8BD707-D9CF-40AE-B4C6-C98DA3205C09}" type="datetimeFigureOut">
               <a:rPr lang="en-US" smtClean="0"/>
               <a:pPr/>
-              <a:t>10/30/2014</a:t>
+              <a:t>11/16/2014</a:t>
             </a:fld>
             <a:endParaRPr lang="en-US"/>
           </a:p>
@@ -1331,7 +1332,7 @@
             <a:fld id="{1D8BD707-D9CF-40AE-B4C6-C98DA3205C09}" type="datetimeFigureOut">
               <a:rPr lang="en-US" smtClean="0"/>
               <a:pPr/>
-              <a:t>10/30/2014</a:t>
+              <a:t>11/16/2014</a:t>
             </a:fld>
             <a:endParaRPr lang="en-US"/>
           </a:p>
@@ -1750,7 +1751,7 @@
             <a:fld id="{1D8BD707-D9CF-40AE-B4C6-C98DA3205C09}" type="datetimeFigureOut">
               <a:rPr lang="en-US" smtClean="0"/>
               <a:pPr/>
-              <a:t>10/30/2014</a:t>
+              <a:t>11/16/2014</a:t>
             </a:fld>
             <a:endParaRPr lang="en-US"/>
           </a:p>
@@ -1865,7 +1866,7 @@
             <a:fld id="{1D8BD707-D9CF-40AE-B4C6-C98DA3205C09}" type="datetimeFigureOut">
               <a:rPr lang="en-US" smtClean="0"/>
               <a:pPr/>
-              <a:t>10/30/2014</a:t>
+              <a:t>11/16/2014</a:t>
             </a:fld>
             <a:endParaRPr lang="en-US"/>
           </a:p>
@@ -1957,7 +1958,7 @@
             <a:fld id="{1D8BD707-D9CF-40AE-B4C6-C98DA3205C09}" type="datetimeFigureOut">
               <a:rPr lang="en-US" smtClean="0"/>
               <a:pPr/>
-              <a:t>10/30/2014</a:t>
+              <a:t>11/16/2014</a:t>
             </a:fld>
             <a:endParaRPr lang="en-US"/>
           </a:p>
@@ -2231,7 +2232,7 @@
             <a:fld id="{1D8BD707-D9CF-40AE-B4C6-C98DA3205C09}" type="datetimeFigureOut">
               <a:rPr lang="en-US" smtClean="0"/>
               <a:pPr/>
-              <a:t>10/30/2014</a:t>
+              <a:t>11/16/2014</a:t>
             </a:fld>
             <a:endParaRPr lang="en-US"/>
           </a:p>
@@ -2481,7 +2482,7 @@
             <a:fld id="{1D8BD707-D9CF-40AE-B4C6-C98DA3205C09}" type="datetimeFigureOut">
               <a:rPr lang="en-US" smtClean="0"/>
               <a:pPr/>
-              <a:t>10/30/2014</a:t>
+              <a:t>11/16/2014</a:t>
             </a:fld>
             <a:endParaRPr lang="en-US"/>
           </a:p>
@@ -2691,7 +2692,7 @@
             <a:fld id="{1D8BD707-D9CF-40AE-B4C6-C98DA3205C09}" type="datetimeFigureOut">
               <a:rPr lang="en-US" smtClean="0"/>
               <a:pPr/>
-              <a:t>10/30/2014</a:t>
+              <a:t>11/16/2014</a:t>
             </a:fld>
             <a:endParaRPr lang="en-US"/>
           </a:p>
@@ -7190,6 +7191,385 @@
 </file>
 
 <file path=ppt/slides/slide4.xml><?xml version="1.0" encoding="utf-8"?>
+<p:sld xmlns:a="http://schemas.openxmlformats.org/drawingml/2006/main" xmlns:r="http://schemas.openxmlformats.org/officeDocument/2006/relationships" xmlns:p="http://schemas.openxmlformats.org/presentationml/2006/main">
+  <p:cSld>
+    <p:spTree>
+      <p:nvGrpSpPr>
+        <p:cNvPr id="1" name=""/>
+        <p:cNvGrpSpPr/>
+        <p:nvPr/>
+      </p:nvGrpSpPr>
+      <p:grpSpPr>
+        <a:xfrm>
+          <a:off x="0" y="0"/>
+          <a:ext cx="0" cy="0"/>
+          <a:chOff x="0" y="0"/>
+          <a:chExt cx="0" cy="0"/>
+        </a:xfrm>
+      </p:grpSpPr>
+      <p:sp>
+        <p:nvSpPr>
+          <p:cNvPr id="2" name="Oval 1"/>
+          <p:cNvSpPr/>
+          <p:nvPr/>
+        </p:nvSpPr>
+        <p:spPr>
+          <a:xfrm>
+            <a:off x="2264875" y="1219200"/>
+            <a:ext cx="152400" cy="152400"/>
+          </a:xfrm>
+          <a:prstGeom prst="ellipse">
+            <a:avLst/>
+          </a:prstGeom>
+          <a:solidFill>
+            <a:schemeClr val="tx1"/>
+          </a:solidFill>
+          <a:ln>
+            <a:solidFill>
+              <a:schemeClr val="tx1"/>
+            </a:solidFill>
+          </a:ln>
+        </p:spPr>
+        <p:style>
+          <a:lnRef idx="2">
+            <a:schemeClr val="accent1">
+              <a:shade val="50000"/>
+            </a:schemeClr>
+          </a:lnRef>
+          <a:fillRef idx="1">
+            <a:schemeClr val="accent1"/>
+          </a:fillRef>
+          <a:effectRef idx="0">
+            <a:schemeClr val="accent1"/>
+          </a:effectRef>
+          <a:fontRef idx="minor">
+            <a:schemeClr val="lt1"/>
+          </a:fontRef>
+        </p:style>
+        <p:txBody>
+          <a:bodyPr rtlCol="0" anchor="ctr"/>
+          <a:lstStyle/>
+          <a:p>
+            <a:pPr algn="ctr"/>
+            <a:endParaRPr lang="en-US"/>
+          </a:p>
+        </p:txBody>
+      </p:sp>
+      <p:sp>
+        <p:nvSpPr>
+          <p:cNvPr id="4" name="Oval 3"/>
+          <p:cNvSpPr/>
+          <p:nvPr/>
+        </p:nvSpPr>
+        <p:spPr>
+          <a:xfrm>
+            <a:off x="3810000" y="4648200"/>
+            <a:ext cx="152400" cy="152400"/>
+          </a:xfrm>
+          <a:prstGeom prst="ellipse">
+            <a:avLst/>
+          </a:prstGeom>
+          <a:solidFill>
+            <a:schemeClr val="tx1"/>
+          </a:solidFill>
+          <a:ln>
+            <a:solidFill>
+              <a:schemeClr val="tx1"/>
+            </a:solidFill>
+          </a:ln>
+        </p:spPr>
+        <p:style>
+          <a:lnRef idx="2">
+            <a:schemeClr val="accent1">
+              <a:shade val="50000"/>
+            </a:schemeClr>
+          </a:lnRef>
+          <a:fillRef idx="1">
+            <a:schemeClr val="accent1"/>
+          </a:fillRef>
+          <a:effectRef idx="0">
+            <a:schemeClr val="accent1"/>
+          </a:effectRef>
+          <a:fontRef idx="minor">
+            <a:schemeClr val="lt1"/>
+          </a:fontRef>
+        </p:style>
+        <p:txBody>
+          <a:bodyPr rtlCol="0" anchor="ctr"/>
+          <a:lstStyle/>
+          <a:p>
+            <a:pPr algn="ctr"/>
+            <a:endParaRPr lang="en-US"/>
+          </a:p>
+        </p:txBody>
+      </p:sp>
+      <p:sp>
+        <p:nvSpPr>
+          <p:cNvPr id="5" name="Oval 4"/>
+          <p:cNvSpPr/>
+          <p:nvPr/>
+        </p:nvSpPr>
+        <p:spPr>
+          <a:xfrm>
+            <a:off x="1143000" y="4581053"/>
+            <a:ext cx="152400" cy="152400"/>
+          </a:xfrm>
+          <a:prstGeom prst="ellipse">
+            <a:avLst/>
+          </a:prstGeom>
+          <a:solidFill>
+            <a:schemeClr val="tx1"/>
+          </a:solidFill>
+          <a:ln>
+            <a:solidFill>
+              <a:schemeClr val="tx1"/>
+            </a:solidFill>
+          </a:ln>
+        </p:spPr>
+        <p:style>
+          <a:lnRef idx="2">
+            <a:schemeClr val="accent1">
+              <a:shade val="50000"/>
+            </a:schemeClr>
+          </a:lnRef>
+          <a:fillRef idx="1">
+            <a:schemeClr val="accent1"/>
+          </a:fillRef>
+          <a:effectRef idx="0">
+            <a:schemeClr val="accent1"/>
+          </a:effectRef>
+          <a:fontRef idx="minor">
+            <a:schemeClr val="lt1"/>
+          </a:fontRef>
+        </p:style>
+        <p:txBody>
+          <a:bodyPr rtlCol="0" anchor="ctr"/>
+          <a:lstStyle/>
+          <a:p>
+            <a:pPr algn="ctr"/>
+            <a:endParaRPr lang="en-US"/>
+          </a:p>
+        </p:txBody>
+      </p:sp>
+      <p:cxnSp>
+        <p:nvCxnSpPr>
+          <p:cNvPr id="7" name="Straight Connector 6"/>
+          <p:cNvCxnSpPr/>
+          <p:nvPr/>
+        </p:nvCxnSpPr>
+        <p:spPr>
+          <a:xfrm flipH="1">
+            <a:off x="1219200" y="1219200"/>
+            <a:ext cx="1121875" cy="3361853"/>
+          </a:xfrm>
+          <a:prstGeom prst="line">
+            <a:avLst/>
+          </a:prstGeom>
+          <a:ln w="25400">
+            <a:solidFill>
+              <a:schemeClr val="tx1"/>
+            </a:solidFill>
+          </a:ln>
+        </p:spPr>
+        <p:style>
+          <a:lnRef idx="1">
+            <a:schemeClr val="accent1"/>
+          </a:lnRef>
+          <a:fillRef idx="0">
+            <a:schemeClr val="accent1"/>
+          </a:fillRef>
+          <a:effectRef idx="0">
+            <a:schemeClr val="accent1"/>
+          </a:effectRef>
+          <a:fontRef idx="minor">
+            <a:schemeClr val="tx1"/>
+          </a:fontRef>
+        </p:style>
+      </p:cxnSp>
+      <p:cxnSp>
+        <p:nvCxnSpPr>
+          <p:cNvPr id="9" name="Straight Connector 8"/>
+          <p:cNvCxnSpPr/>
+          <p:nvPr/>
+        </p:nvCxnSpPr>
+        <p:spPr>
+          <a:xfrm>
+            <a:off x="2367798" y="1276858"/>
+            <a:ext cx="1491679" cy="3456159"/>
+          </a:xfrm>
+          <a:prstGeom prst="line">
+            <a:avLst/>
+          </a:prstGeom>
+          <a:ln w="25400">
+            <a:solidFill>
+              <a:schemeClr val="tx1"/>
+            </a:solidFill>
+          </a:ln>
+        </p:spPr>
+        <p:style>
+          <a:lnRef idx="1">
+            <a:schemeClr val="accent1"/>
+          </a:lnRef>
+          <a:fillRef idx="0">
+            <a:schemeClr val="accent1"/>
+          </a:fillRef>
+          <a:effectRef idx="0">
+            <a:schemeClr val="accent1"/>
+          </a:effectRef>
+          <a:fontRef idx="minor">
+            <a:schemeClr val="tx1"/>
+          </a:fontRef>
+        </p:style>
+      </p:cxnSp>
+      <p:cxnSp>
+        <p:nvCxnSpPr>
+          <p:cNvPr id="15" name="Straight Connector 14"/>
+          <p:cNvCxnSpPr>
+            <a:stCxn id="4" idx="2"/>
+            <a:endCxn id="5" idx="5"/>
+          </p:cNvCxnSpPr>
+          <p:nvPr/>
+        </p:nvCxnSpPr>
+        <p:spPr>
+          <a:xfrm flipH="1" flipV="1">
+            <a:off x="1273082" y="4711135"/>
+            <a:ext cx="2536918" cy="13265"/>
+          </a:xfrm>
+          <a:prstGeom prst="line">
+            <a:avLst/>
+          </a:prstGeom>
+          <a:ln w="25400">
+            <a:solidFill>
+              <a:schemeClr val="tx1"/>
+            </a:solidFill>
+          </a:ln>
+        </p:spPr>
+        <p:style>
+          <a:lnRef idx="1">
+            <a:schemeClr val="accent1"/>
+          </a:lnRef>
+          <a:fillRef idx="0">
+            <a:schemeClr val="accent1"/>
+          </a:fillRef>
+          <a:effectRef idx="0">
+            <a:schemeClr val="accent1"/>
+          </a:effectRef>
+          <a:fontRef idx="minor">
+            <a:schemeClr val="tx1"/>
+          </a:fontRef>
+        </p:style>
+      </p:cxnSp>
+      <p:sp>
+        <p:nvSpPr>
+          <p:cNvPr id="24" name="TextBox 23"/>
+          <p:cNvSpPr txBox="1"/>
+          <p:nvPr/>
+        </p:nvSpPr>
+        <p:spPr>
+          <a:xfrm>
+            <a:off x="763613" y="4883564"/>
+            <a:ext cx="405880" cy="369332"/>
+          </a:xfrm>
+          <a:prstGeom prst="rect">
+            <a:avLst/>
+          </a:prstGeom>
+          <a:noFill/>
+        </p:spPr>
+        <p:txBody>
+          <a:bodyPr wrap="none" rtlCol="0">
+            <a:spAutoFit/>
+          </a:bodyPr>
+          <a:lstStyle/>
+          <a:p>
+            <a:r>
+              <a:rPr lang="en-US" dirty="0" smtClean="0"/>
+              <a:t>v0</a:t>
+            </a:r>
+            <a:endParaRPr lang="en-US" dirty="0"/>
+          </a:p>
+        </p:txBody>
+      </p:sp>
+      <p:sp>
+        <p:nvSpPr>
+          <p:cNvPr id="26" name="TextBox 25"/>
+          <p:cNvSpPr txBox="1"/>
+          <p:nvPr/>
+        </p:nvSpPr>
+        <p:spPr>
+          <a:xfrm>
+            <a:off x="3992399" y="4883564"/>
+            <a:ext cx="405880" cy="369332"/>
+          </a:xfrm>
+          <a:prstGeom prst="rect">
+            <a:avLst/>
+          </a:prstGeom>
+          <a:noFill/>
+        </p:spPr>
+        <p:txBody>
+          <a:bodyPr wrap="none" rtlCol="0">
+            <a:spAutoFit/>
+          </a:bodyPr>
+          <a:lstStyle/>
+          <a:p>
+            <a:r>
+              <a:rPr lang="en-US" dirty="0" smtClean="0"/>
+              <a:t>v1</a:t>
+            </a:r>
+            <a:endParaRPr lang="en-US" dirty="0"/>
+          </a:p>
+        </p:txBody>
+      </p:sp>
+      <p:sp>
+        <p:nvSpPr>
+          <p:cNvPr id="27" name="TextBox 26"/>
+          <p:cNvSpPr txBox="1"/>
+          <p:nvPr/>
+        </p:nvSpPr>
+        <p:spPr>
+          <a:xfrm>
+            <a:off x="1904571" y="1002098"/>
+            <a:ext cx="405880" cy="369332"/>
+          </a:xfrm>
+          <a:prstGeom prst="rect">
+            <a:avLst/>
+          </a:prstGeom>
+          <a:noFill/>
+        </p:spPr>
+        <p:txBody>
+          <a:bodyPr wrap="none" rtlCol="0">
+            <a:spAutoFit/>
+          </a:bodyPr>
+          <a:lstStyle/>
+          <a:p>
+            <a:r>
+              <a:rPr lang="en-US" dirty="0" smtClean="0"/>
+              <a:t>v2</a:t>
+            </a:r>
+            <a:endParaRPr lang="en-US" dirty="0"/>
+          </a:p>
+        </p:txBody>
+      </p:sp>
+    </p:spTree>
+    <p:extLst>
+      <p:ext uri="{BB962C8B-B14F-4D97-AF65-F5344CB8AC3E}">
+        <p14:creationId xmlns:p14="http://schemas.microsoft.com/office/powerpoint/2010/main" val="896804140"/>
+      </p:ext>
+    </p:extLst>
+  </p:cSld>
+  <p:clrMapOvr>
+    <a:masterClrMapping/>
+  </p:clrMapOvr>
+  <p:timing>
+    <p:tnLst>
+      <p:par>
+        <p:cTn id="1" dur="indefinite" restart="never" nodeType="tmRoot"/>
+      </p:par>
+    </p:tnLst>
+  </p:timing>
+</p:sld>
+</file>
+
+<file path=ppt/slides/slide5.xml><?xml version="1.0" encoding="utf-8"?>
 <p:sld xmlns:a="http://schemas.openxmlformats.org/drawingml/2006/main" xmlns:r="http://schemas.openxmlformats.org/officeDocument/2006/relationships" xmlns:p="http://schemas.openxmlformats.org/presentationml/2006/main">
   <p:cSld>
     <p:spTree>

</xml_diff>